<commit_message>
Initial @krzysiekwie lectures translation
</commit_message>
<xml_diff>
--- a/lectures3/Pythonlearn-16-Data-Viz.pptx
+++ b/lectures3/Pythonlearn-16-Data-Viz.pptx
@@ -26,7 +26,7 @@
     <p:sldId id="271" r:id="rId17"/>
     <p:sldId id="272" r:id="rId18"/>
     <p:sldId id="273" r:id="rId19"/>
-    <p:sldId id="274" r:id="rId20"/>
+    <p:sldId id="315" r:id="rId20"/>
   </p:sldIdLst>
   <p:sldSz cx="9144000" cy="5143500" type="screen16x9"/>
   <p:notesSz cx="6858000" cy="9144000"/>
@@ -234,10 +234,21 @@
   </p:defaultTextStyle>
   <p:extLst>
     <p:ext uri="{EFAFB233-063F-42B5-8137-9DF3F51BA10A}">
-      <p15:sldGuideLst xmlns="" xmlns:p15="http://schemas.microsoft.com/office/powerpoint/2012/main"/>
+      <p15:sldGuideLst xmlns:p15="http://schemas.microsoft.com/office/powerpoint/2012/main">
+        <p15:guide id="1" orient="horz" pos="1620">
+          <p15:clr>
+            <a:srgbClr val="A4A3A4"/>
+          </p15:clr>
+        </p15:guide>
+        <p15:guide id="2" pos="2880">
+          <p15:clr>
+            <a:srgbClr val="A4A3A4"/>
+          </p15:clr>
+        </p15:guide>
+      </p15:sldGuideLst>
     </p:ext>
     <p:ext uri="{2D200454-40CA-4A62-9FC3-DE9A4176ACB9}">
-      <p15:notesGuideLst xmlns="" xmlns:p15="http://schemas.microsoft.com/office/powerpoint/2012/main"/>
+      <p15:notesGuideLst xmlns:p15="http://schemas.microsoft.com/office/powerpoint/2012/main"/>
     </p:ext>
   </p:extLst>
 </p:presentation>
@@ -563,7 +574,7 @@
               <a:buNone/>
             </a:pPr>
             <a:r>
-              <a:rPr lang="en" sz="1100" b="0" i="0" u="none" strike="noStrike" cap="none" dirty="0" smtClean="0">
+              <a:rPr lang="pl" sz="1100" b="0" i="0" u="none" strike="noStrike" cap="none" baseline="0">
                 <a:solidFill>
                   <a:schemeClr val="dk2"/>
                 </a:solidFill>
@@ -572,57 +583,9 @@
                 <a:cs typeface="Arial"/>
                 <a:sym typeface="Arial"/>
               </a:rPr>
-              <a:t>Note from Chuck.  If you are using these materials, you can remove the UM logo and replace it with your own, but please retain the CC-BY logo on the first page as well as retain the </a:t>
-            </a:r>
-            <a:r>
-              <a:rPr lang="en-US" sz="1100" b="0" i="0" u="none" strike="noStrike" cap="none" dirty="0" smtClean="0">
-                <a:solidFill>
-                  <a:schemeClr val="dk2"/>
-                </a:solidFill>
-                <a:latin typeface="+mn-lt"/>
-                <a:ea typeface="Arial"/>
-                <a:cs typeface="Arial"/>
-                <a:sym typeface="Arial"/>
-              </a:rPr>
-              <a:t>acknowledgement </a:t>
-            </a:r>
-            <a:r>
-              <a:rPr lang="en" sz="1100" b="0" i="0" u="none" strike="noStrike" cap="none" dirty="0" smtClean="0">
-                <a:solidFill>
-                  <a:schemeClr val="dk2"/>
-                </a:solidFill>
-                <a:latin typeface="+mn-lt"/>
-                <a:ea typeface="Arial"/>
-                <a:cs typeface="Arial"/>
-                <a:sym typeface="Arial"/>
-              </a:rPr>
-              <a:t>page</a:t>
-            </a:r>
-            <a:r>
-              <a:rPr lang="en-US" sz="1100" b="0" i="0" u="none" strike="noStrike" cap="none" dirty="0" smtClean="0">
-                <a:solidFill>
-                  <a:schemeClr val="dk2"/>
-                </a:solidFill>
-                <a:latin typeface="+mn-lt"/>
-                <a:ea typeface="Arial"/>
-                <a:cs typeface="Arial"/>
-                <a:sym typeface="Arial"/>
-              </a:rPr>
-              <a:t>(s) at the end</a:t>
-            </a:r>
-            <a:r>
-              <a:rPr lang="en" sz="1100" b="0" i="0" u="none" strike="noStrike" cap="none" smtClean="0">
-                <a:solidFill>
-                  <a:schemeClr val="dk2"/>
-                </a:solidFill>
-                <a:latin typeface="+mn-lt"/>
-                <a:ea typeface="Arial"/>
-                <a:cs typeface="Arial"/>
-                <a:sym typeface="Arial"/>
-              </a:rPr>
-              <a:t>.</a:t>
-            </a:r>
-            <a:endParaRPr lang="en" sz="1100" b="0" i="0" u="none" strike="noStrike" cap="none" dirty="0">
+              <a:t>Notka od Chucka  Używając tych materiałów masz prawo usunąć logo UM i zastąpić je własnym ale zostaw proszę logo CC-BY na pierwszej stronie oraz strony z podziękowaniami dla współtwórców.</a:t>
+            </a:r>
+            <a:endParaRPr lang="pl" sz="1100" b="0" i="0" u="none" strike="noStrike" cap="none" dirty="0">
               <a:solidFill>
                 <a:schemeClr val="dk2"/>
               </a:solidFill>
@@ -734,7 +697,7 @@
           </a:bodyPr>
           <a:lstStyle/>
           <a:p>
-            <a:pPr lvl="0">
+            <a:pPr lvl="0" algn="l" rtl="0">
               <a:spcBef>
                 <a:spcPts val="0"/>
               </a:spcBef>
@@ -844,7 +807,7 @@
           </a:bodyPr>
           <a:lstStyle/>
           <a:p>
-            <a:pPr lvl="0">
+            <a:pPr lvl="0" algn="l" rtl="0">
               <a:spcBef>
                 <a:spcPts val="0"/>
               </a:spcBef>
@@ -954,7 +917,7 @@
           </a:bodyPr>
           <a:lstStyle/>
           <a:p>
-            <a:pPr lvl="0">
+            <a:pPr lvl="0" algn="l" rtl="0">
               <a:spcBef>
                 <a:spcPts val="0"/>
               </a:spcBef>
@@ -1064,7 +1027,7 @@
           </a:bodyPr>
           <a:lstStyle/>
           <a:p>
-            <a:pPr lvl="0">
+            <a:pPr lvl="0" algn="l" rtl="0">
               <a:spcBef>
                 <a:spcPts val="0"/>
               </a:spcBef>
@@ -1174,7 +1137,7 @@
           </a:bodyPr>
           <a:lstStyle/>
           <a:p>
-            <a:pPr lvl="0">
+            <a:pPr lvl="0" algn="l" rtl="0">
               <a:spcBef>
                 <a:spcPts val="0"/>
               </a:spcBef>
@@ -1284,7 +1247,7 @@
           </a:bodyPr>
           <a:lstStyle/>
           <a:p>
-            <a:pPr lvl="0">
+            <a:pPr lvl="0" algn="l" rtl="0">
               <a:spcBef>
                 <a:spcPts val="0"/>
               </a:spcBef>
@@ -1394,7 +1357,7 @@
           </a:bodyPr>
           <a:lstStyle/>
           <a:p>
-            <a:pPr lvl="0">
+            <a:pPr lvl="0" algn="l" rtl="0">
               <a:spcBef>
                 <a:spcPts val="0"/>
               </a:spcBef>
@@ -1504,7 +1467,7 @@
           </a:bodyPr>
           <a:lstStyle/>
           <a:p>
-            <a:pPr lvl="0">
+            <a:pPr lvl="0" algn="l" rtl="0">
               <a:spcBef>
                 <a:spcPts val="0"/>
               </a:spcBef>
@@ -1614,7 +1577,7 @@
           </a:bodyPr>
           <a:lstStyle/>
           <a:p>
-            <a:pPr lvl="0">
+            <a:pPr lvl="0" algn="l" rtl="0">
               <a:spcBef>
                 <a:spcPts val="0"/>
               </a:spcBef>
@@ -1683,7 +1646,7 @@
   <p:cSld>
     <p:spTree>
       <p:nvGrpSpPr>
-        <p:cNvPr id="1" name="Shape 316"/>
+        <p:cNvPr id="1" name="Shape 790"/>
         <p:cNvGrpSpPr/>
         <p:nvPr/>
       </p:nvGrpSpPr>
@@ -1697,46 +1660,7 @@
       </p:grpSpPr>
       <p:sp>
         <p:nvSpPr>
-          <p:cNvPr id="317" name="Shape 317"/>
-          <p:cNvSpPr txBox="1">
-            <a:spLocks noGrp="1"/>
-          </p:cNvSpPr>
-          <p:nvPr>
-            <p:ph type="body" idx="1"/>
-          </p:nvPr>
-        </p:nvSpPr>
-        <p:spPr>
-          <a:xfrm>
-            <a:off x="914400" y="4343400"/>
-            <a:ext cx="5029199" cy="4114800"/>
-          </a:xfrm>
-          <a:prstGeom prst="rect">
-            <a:avLst/>
-          </a:prstGeom>
-          <a:noFill/>
-          <a:ln>
-            <a:noFill/>
-          </a:ln>
-        </p:spPr>
-        <p:txBody>
-          <a:bodyPr lIns="91425" tIns="91425" rIns="91425" bIns="91425" anchor="ctr" anchorCtr="0">
-            <a:noAutofit/>
-          </a:bodyPr>
-          <a:lstStyle/>
-          <a:p>
-            <a:pPr lvl="0">
-              <a:spcBef>
-                <a:spcPts val="0"/>
-              </a:spcBef>
-              <a:buNone/>
-            </a:pPr>
-            <a:endParaRPr/>
-          </a:p>
-        </p:txBody>
-      </p:sp>
-      <p:sp>
-        <p:nvSpPr>
-          <p:cNvPr id="318" name="Shape 318"/>
+          <p:cNvPr id="791" name="Shape 791"/>
           <p:cNvSpPr>
             <a:spLocks noGrp="1" noRot="1" noChangeAspect="1"/>
           </p:cNvSpPr>
@@ -1775,10 +1699,45 @@
           </a:custGeom>
         </p:spPr>
       </p:sp>
+      <p:sp>
+        <p:nvSpPr>
+          <p:cNvPr id="792" name="Shape 792"/>
+          <p:cNvSpPr txBox="1">
+            <a:spLocks noGrp="1"/>
+          </p:cNvSpPr>
+          <p:nvPr>
+            <p:ph type="body" idx="1"/>
+          </p:nvPr>
+        </p:nvSpPr>
+        <p:spPr>
+          <a:xfrm>
+            <a:off x="685800" y="4343400"/>
+            <a:ext cx="5486399" cy="4114800"/>
+          </a:xfrm>
+          <a:prstGeom prst="rect">
+            <a:avLst/>
+          </a:prstGeom>
+        </p:spPr>
+        <p:txBody>
+          <a:bodyPr lIns="91425" tIns="91425" rIns="91425" bIns="91425" anchor="ctr" anchorCtr="0">
+            <a:noAutofit/>
+          </a:bodyPr>
+          <a:lstStyle/>
+          <a:p>
+            <a:pPr lvl="0" algn="l" rtl="0">
+              <a:spcBef>
+                <a:spcPts val="0"/>
+              </a:spcBef>
+              <a:buNone/>
+            </a:pPr>
+            <a:endParaRPr/>
+          </a:p>
+        </p:txBody>
+      </p:sp>
     </p:spTree>
     <p:extLst>
       <p:ext uri="{BB962C8B-B14F-4D97-AF65-F5344CB8AC3E}">
-        <p14:creationId xmlns:p14="http://schemas.microsoft.com/office/powerpoint/2010/main" val="111193181"/>
+        <p14:creationId xmlns:p14="http://schemas.microsoft.com/office/powerpoint/2010/main" val="2131954588"/>
       </p:ext>
     </p:extLst>
   </p:cSld>
@@ -1834,7 +1793,7 @@
           </a:bodyPr>
           <a:lstStyle/>
           <a:p>
-            <a:pPr lvl="0">
+            <a:pPr lvl="0" algn="l" rtl="0">
               <a:spcBef>
                 <a:spcPts val="0"/>
               </a:spcBef>
@@ -1997,13 +1956,13 @@
               <a:buNone/>
             </a:pPr>
             <a:r>
-              <a:rPr lang="en" sz="2000" b="0" i="0" u="none" strike="noStrike" cap="none">
+              <a:rPr lang="pl" sz="2000" b="0" i="0" u="none" strike="noStrike" cap="none" baseline="0">
                 <a:latin typeface="Merriweather Sans"/>
                 <a:ea typeface="Merriweather Sans"/>
                 <a:cs typeface="Merriweather Sans"/>
                 <a:sym typeface="Merriweather Sans"/>
               </a:rPr>
-              <a:t>We will call my approach "Personal Data Mining" – mostly focused on getting better as Python Programmers.</a:t>
+              <a:t>Moje podejście nazwiemy "pobieraniem na własny użytek" - głównie po to, by być lepszymi programistami Pythona</a:t>
             </a:r>
           </a:p>
         </p:txBody>
@@ -2067,7 +2026,7 @@
           </a:bodyPr>
           <a:lstStyle/>
           <a:p>
-            <a:pPr lvl="0">
+            <a:pPr lvl="0" algn="l" rtl="0">
               <a:spcBef>
                 <a:spcPts val="0"/>
               </a:spcBef>
@@ -2177,7 +2136,7 @@
           </a:bodyPr>
           <a:lstStyle/>
           <a:p>
-            <a:pPr lvl="0">
+            <a:pPr lvl="0" algn="l" rtl="0">
               <a:spcBef>
                 <a:spcPts val="0"/>
               </a:spcBef>
@@ -2287,7 +2246,7 @@
           </a:bodyPr>
           <a:lstStyle/>
           <a:p>
-            <a:pPr lvl="0">
+            <a:pPr lvl="0" algn="l" rtl="0">
               <a:spcBef>
                 <a:spcPts val="0"/>
               </a:spcBef>
@@ -2397,7 +2356,7 @@
           </a:bodyPr>
           <a:lstStyle/>
           <a:p>
-            <a:pPr lvl="0">
+            <a:pPr lvl="0" algn="l" rtl="0">
               <a:spcBef>
                 <a:spcPts val="0"/>
               </a:spcBef>
@@ -2507,7 +2466,7 @@
           </a:bodyPr>
           <a:lstStyle/>
           <a:p>
-            <a:pPr lvl="0">
+            <a:pPr lvl="0" algn="l" rtl="0">
               <a:spcBef>
                 <a:spcPts val="0"/>
               </a:spcBef>
@@ -2617,7 +2576,7 @@
           </a:bodyPr>
           <a:lstStyle/>
           <a:p>
-            <a:pPr lvl="0">
+            <a:pPr lvl="0" algn="l" rtl="0">
               <a:spcBef>
                 <a:spcPts val="0"/>
               </a:spcBef>
@@ -3684,7 +3643,6 @@
           <a:ln>
             <a:noFill/>
           </a:ln>
-          <a:extLst/>
         </p:spPr>
         <p:txBody>
           <a:bodyPr/>
@@ -3808,7 +3766,7 @@
             <a:pPr eaLnBrk="1" hangingPunct="1">
               <a:defRPr/>
             </a:pPr>
-            <a:endParaRPr lang="en-US" altLang="en-US" sz="2025" smtClean="0"/>
+            <a:endParaRPr lang="en-US" altLang="en-US" sz="2025"/>
           </a:p>
         </p:txBody>
       </p:sp>
@@ -3834,7 +3792,6 @@
           <a:ln>
             <a:noFill/>
           </a:ln>
-          <a:extLst/>
         </p:spPr>
         <p:txBody>
           <a:bodyPr/>
@@ -3958,7 +3915,7 @@
             <a:pPr eaLnBrk="1" hangingPunct="1">
               <a:defRPr/>
             </a:pPr>
-            <a:endParaRPr lang="en-US" altLang="en-US" sz="2025" smtClean="0"/>
+            <a:endParaRPr lang="en-US" altLang="en-US" sz="2025"/>
           </a:p>
         </p:txBody>
       </p:sp>
@@ -4448,6 +4405,10 @@
           </p:nvPr>
         </p:nvSpPr>
         <p:spPr>
+          <a:xfrm>
+            <a:off x="0" y="864394"/>
+            <a:ext cx="9077325" cy="1735931"/>
+          </a:xfrm>
           <a:prstGeom prst="rect">
             <a:avLst/>
           </a:prstGeom>
@@ -4470,13 +4431,13 @@
               <a:buNone/>
             </a:pPr>
             <a:r>
-              <a:rPr lang="en" sz="4300" u="none" strike="noStrike" cap="none">
+              <a:rPr lang="pl" sz="4300" b="0" i="0" u="none" strike="noStrike" cap="none" baseline="0" dirty="0">
                 <a:solidFill>
                   <a:srgbClr val="FFD966"/>
                 </a:solidFill>
                 <a:sym typeface="Cabin"/>
               </a:rPr>
-              <a:t>Retrieving and Visualizing Data</a:t>
+              <a:t>Pobieranie i wizualizacja danych</a:t>
             </a:r>
           </a:p>
         </p:txBody>
@@ -4518,7 +4479,7 @@
               <a:buNone/>
             </a:pPr>
             <a:r>
-              <a:rPr lang="en" sz="1800" u="none" strike="noStrike" cap="none">
+              <a:rPr lang="pl" sz="1800" b="0" i="0" u="none" strike="noStrike" cap="none" baseline="0">
                 <a:solidFill>
                   <a:srgbClr val="FFFFFF"/>
                 </a:solidFill>
@@ -4572,7 +4533,7 @@
               <a:buNone/>
             </a:pPr>
             <a:r>
-              <a:rPr lang="en-US" sz="1800" u="none" strike="noStrike" cap="none" dirty="0" smtClean="0">
+              <a:rPr lang="pl" sz="1800" b="0" i="0" u="none" strike="noStrike" cap="none" baseline="0">
                 <a:solidFill>
                   <a:srgbClr val="FFFF00"/>
                 </a:solidFill>
@@ -4581,7 +4542,7 @@
                 <a:cs typeface="Arial Regular" charset="0"/>
                 <a:sym typeface="Cabin"/>
               </a:rPr>
-              <a:t>Python for Everybody</a:t>
+              <a:t>Python dla wszystkich</a:t>
             </a:r>
           </a:p>
           <a:p>
@@ -4603,7 +4564,7 @@
               <a:buNone/>
             </a:pPr>
             <a:r>
-              <a:rPr lang="en-US" sz="1800" dirty="0" smtClean="0">
+              <a:rPr lang="pl" sz="1800" b="0" i="0" u="none" baseline="0">
                 <a:solidFill>
                   <a:srgbClr val="FFFF00"/>
                 </a:solidFill>
@@ -4614,7 +4575,7 @@
               </a:rPr>
               <a:t>www.py4e.com</a:t>
             </a:r>
-            <a:endParaRPr lang="en-US" sz="1800" u="none" strike="noStrike" cap="none" dirty="0">
+            <a:endParaRPr lang="pl" sz="1800" u="none" strike="noStrike" cap="none" dirty="0">
               <a:solidFill>
                 <a:srgbClr val="FFFF00"/>
               </a:solidFill>
@@ -4685,13 +4646,6 @@
   <p:clrMapOvr>
     <a:masterClrMapping/>
   </p:clrMapOvr>
-  <p:timing>
-    <p:tnLst>
-      <p:par>
-        <p:cTn xmlns:p14="http://schemas.microsoft.com/office/powerpoint/2010/main" id="1" dur="indefinite" restart="never" nodeType="tmRoot"/>
-      </p:par>
-    </p:tnLst>
-  </p:timing>
 </p:sld>
 </file>
 
@@ -4749,13 +4703,13 @@
               <a:buNone/>
             </a:pPr>
             <a:r>
-              <a:rPr lang="en" sz="4300" u="none" strike="noStrike" cap="none">
+              <a:rPr lang="pl" sz="4300" b="0" i="0" u="none" strike="noStrike" cap="none" baseline="0">
                 <a:solidFill>
                   <a:srgbClr val="FFD966"/>
                 </a:solidFill>
                 <a:sym typeface="Cabin"/>
               </a:rPr>
-              <a:t>Web Crawler</a:t>
+              <a:t>Roboty internetowe</a:t>
             </a:r>
           </a:p>
         </p:txBody>
@@ -4800,13 +4754,13 @@
               <a:buFont typeface="Cabin"/>
             </a:pPr>
             <a:r>
-              <a:rPr lang="en" sz="2000" u="none" strike="noStrike" cap="none" dirty="0">
+              <a:rPr lang="pl" sz="2000" b="0" i="0" u="none" strike="noStrike" cap="none" baseline="0">
                 <a:solidFill>
                   <a:srgbClr val="FFFFFF"/>
                 </a:solidFill>
                 <a:sym typeface="Cabin"/>
               </a:rPr>
-              <a:t>Retrieve a page</a:t>
+              <a:t>Pobierz stronę</a:t>
             </a:r>
           </a:p>
           <a:p>
@@ -4821,13 +4775,13 @@
               <a:buFont typeface="Cabin"/>
             </a:pPr>
             <a:r>
-              <a:rPr lang="en" sz="2000" u="none" strike="noStrike" cap="none" dirty="0">
+              <a:rPr lang="pl" sz="2000" b="0" i="0" u="none" strike="noStrike" cap="none" baseline="0">
                 <a:solidFill>
                   <a:srgbClr val="FFFFFF"/>
                 </a:solidFill>
                 <a:sym typeface="Cabin"/>
               </a:rPr>
-              <a:t>Look through the page for links</a:t>
+              <a:t>Znajdź linki na stronie</a:t>
             </a:r>
           </a:p>
           <a:p>
@@ -4842,13 +4796,13 @@
               <a:buFont typeface="Cabin"/>
             </a:pPr>
             <a:r>
-              <a:rPr lang="en" sz="2000" u="none" strike="noStrike" cap="none" dirty="0">
+              <a:rPr lang="pl" sz="2000" b="0" i="0" u="none" strike="noStrike" cap="none" baseline="0">
                 <a:solidFill>
                   <a:srgbClr val="FFFFFF"/>
                 </a:solidFill>
                 <a:sym typeface="Cabin"/>
               </a:rPr>
-              <a:t>Add the links to a list of “to be retrieved” sites</a:t>
+              <a:t>Dodaj linki do listy stron "do pobrania"</a:t>
             </a:r>
           </a:p>
           <a:p>
@@ -4863,13 +4817,13 @@
               <a:buFont typeface="Cabin"/>
             </a:pPr>
             <a:r>
-              <a:rPr lang="en" sz="2000" u="none" strike="noStrike" cap="none" dirty="0">
+              <a:rPr lang="pl" sz="2000" b="0" i="0" u="none" strike="noStrike" cap="none" baseline="0">
                 <a:solidFill>
                   <a:srgbClr val="FFFFFF"/>
                 </a:solidFill>
                 <a:sym typeface="Cabin"/>
               </a:rPr>
-              <a:t>Repeat...</a:t>
+              <a:t>Powtórz...</a:t>
             </a:r>
           </a:p>
         </p:txBody>
@@ -4936,8 +4890,8 @@
         </p:nvSpPr>
         <p:spPr>
           <a:xfrm>
-            <a:off x="3891825" y="4076499"/>
-            <a:ext cx="4994999" cy="350100"/>
+            <a:off x="3562351" y="4076499"/>
+            <a:ext cx="5324474" cy="350100"/>
           </a:xfrm>
           <a:prstGeom prst="rect">
             <a:avLst/>
@@ -4953,12 +4907,8 @@
           </a:bodyPr>
           <a:lstStyle/>
           <a:p>
-            <a:pPr marL="0" marR="0" lvl="0" indent="0" algn="ctr" rtl="0">
-              <a:spcBef>
-                <a:spcPts val="0"/>
-              </a:spcBef>
+            <a:pPr algn="ctr">
               <a:buSzPct val="25000"/>
-              <a:buNone/>
             </a:pPr>
             <a:r>
               <a:rPr lang="en" sz="2000" u="none" strike="noStrike" cap="none" dirty="0">
@@ -4970,45 +4920,18 @@
                 <a:cs typeface="Arial Regular" charset="0"/>
                 <a:sym typeface="Cabin"/>
               </a:rPr>
-              <a:t>http://</a:t>
-            </a:r>
-            <a:r>
-              <a:rPr lang="en" sz="2000" u="none" strike="noStrike" cap="none" dirty="0" err="1">
-                <a:solidFill>
-                  <a:srgbClr val="FFFF00"/>
-                </a:solidFill>
-                <a:latin typeface="Arial Regular" charset="0"/>
-                <a:ea typeface="Arial Regular" charset="0"/>
-                <a:cs typeface="Arial Regular" charset="0"/>
-                <a:sym typeface="Cabin"/>
-              </a:rPr>
-              <a:t>en.wikipedia.org</a:t>
-            </a:r>
-            <a:r>
-              <a:rPr lang="en" sz="2000" u="none" strike="noStrike" cap="none" dirty="0">
-                <a:solidFill>
-                  <a:srgbClr val="FFFF00"/>
-                </a:solidFill>
-                <a:latin typeface="Arial Regular" charset="0"/>
-                <a:ea typeface="Arial Regular" charset="0"/>
-                <a:cs typeface="Arial Regular" charset="0"/>
-                <a:sym typeface="Cabin"/>
-              </a:rPr>
-              <a:t>/wiki/</a:t>
-            </a:r>
-            <a:r>
-              <a:rPr lang="en" sz="2000" u="none" strike="noStrike" cap="none" dirty="0" err="1">
-                <a:solidFill>
-                  <a:srgbClr val="FFFF00"/>
-                </a:solidFill>
-                <a:latin typeface="Arial Regular" charset="0"/>
-                <a:ea typeface="Arial Regular" charset="0"/>
-                <a:cs typeface="Arial Regular" charset="0"/>
-                <a:sym typeface="Cabin"/>
-              </a:rPr>
-              <a:t>Web_crawler</a:t>
-            </a:r>
-            <a:endParaRPr lang="en" sz="2000" u="none" strike="noStrike" cap="none" dirty="0">
+              <a:t>http://en.wikipedia.org/wiki/Web_crawler</a:t>
+            </a:r>
+          </a:p>
+          <a:p>
+            <a:pPr marL="0" marR="0" lvl="0" indent="0" algn="ctr" rtl="0">
+              <a:spcBef>
+                <a:spcPts val="0"/>
+              </a:spcBef>
+              <a:buSzPct val="25000"/>
+              <a:buNone/>
+            </a:pPr>
+            <a:endParaRPr lang="pl" sz="2000" u="none" strike="noStrike" cap="none" dirty="0">
               <a:solidFill>
                 <a:srgbClr val="FFFF00"/>
               </a:solidFill>
@@ -5025,13 +4948,6 @@
   <p:clrMapOvr>
     <a:masterClrMapping/>
   </p:clrMapOvr>
-  <p:timing>
-    <p:tnLst>
-      <p:par>
-        <p:cTn xmlns:p14="http://schemas.microsoft.com/office/powerpoint/2010/main" id="1" dur="indefinite" restart="never" nodeType="tmRoot"/>
-      </p:par>
-    </p:tnLst>
-  </p:timing>
 </p:sld>
 </file>
 
@@ -5085,13 +5001,13 @@
               <a:buNone/>
             </a:pPr>
             <a:r>
-              <a:rPr lang="en" sz="4300" u="none" strike="noStrike" cap="none">
+              <a:rPr lang="pl" sz="4300" b="0" i="0" u="none" strike="noStrike" cap="none" baseline="0">
                 <a:solidFill>
                   <a:srgbClr val="FFD966"/>
                 </a:solidFill>
                 <a:sym typeface="Cabin"/>
               </a:rPr>
-              <a:t>Web Crawling Policy</a:t>
+              <a:t>Polityka robotów intenetowych</a:t>
             </a:r>
           </a:p>
         </p:txBody>
@@ -5129,31 +5045,22 @@
               <a:buFont typeface="Cabin"/>
             </a:pPr>
             <a:r>
-              <a:rPr lang="en" sz="2000" u="none" strike="noStrike" cap="none" dirty="0">
+              <a:rPr lang="pl" sz="2000" b="0" i="0" u="none" strike="noStrike" cap="none" baseline="0" dirty="0">
+                <a:solidFill>
+                  <a:srgbClr val="00F900"/>
+                </a:solidFill>
+                <a:sym typeface="Cabin"/>
+              </a:rPr>
+              <a:t> polityka wyboru</a:t>
+            </a:r>
+            <a:r>
+              <a:rPr lang="pl" sz="2000" b="0" i="0" u="none" strike="noStrike" cap="none" baseline="0" dirty="0">
                 <a:solidFill>
                   <a:srgbClr val="FFFFFF"/>
                 </a:solidFill>
                 <a:sym typeface="Cabin"/>
               </a:rPr>
-              <a:t>a</a:t>
-            </a:r>
-            <a:r>
-              <a:rPr lang="en" sz="2000" u="none" strike="noStrike" cap="none" dirty="0">
-                <a:solidFill>
-                  <a:srgbClr val="00F900"/>
-                </a:solidFill>
-                <a:sym typeface="Cabin"/>
-              </a:rPr>
-              <a:t> selection policy</a:t>
-            </a:r>
-            <a:r>
-              <a:rPr lang="en" sz="2000" u="none" strike="noStrike" cap="none" dirty="0">
-                <a:solidFill>
-                  <a:srgbClr val="FFFFFF"/>
-                </a:solidFill>
-                <a:sym typeface="Cabin"/>
-              </a:rPr>
-              <a:t> that states which pages to download,</a:t>
+              <a:t> określa, które strony pobrać</a:t>
             </a:r>
           </a:p>
           <a:p>
@@ -5165,31 +5072,22 @@
               <a:buFont typeface="Cabin"/>
             </a:pPr>
             <a:r>
-              <a:rPr lang="en" sz="2000" u="none" strike="noStrike" cap="none" dirty="0">
+              <a:rPr lang="pl" sz="2000" b="0" i="0" u="none" strike="noStrike" cap="none" baseline="0" dirty="0">
+                <a:solidFill>
+                  <a:srgbClr val="00F900"/>
+                </a:solidFill>
+                <a:sym typeface="Cabin"/>
+              </a:rPr>
+              <a:t> polityka powrotu</a:t>
+            </a:r>
+            <a:r>
+              <a:rPr lang="pl" sz="2000" b="0" i="0" u="none" strike="noStrike" cap="none" baseline="0" dirty="0">
                 <a:solidFill>
                   <a:srgbClr val="FFFFFF"/>
                 </a:solidFill>
                 <a:sym typeface="Cabin"/>
               </a:rPr>
-              <a:t>a</a:t>
-            </a:r>
-            <a:r>
-              <a:rPr lang="en" sz="2000" u="none" strike="noStrike" cap="none" dirty="0">
-                <a:solidFill>
-                  <a:srgbClr val="00F900"/>
-                </a:solidFill>
-                <a:sym typeface="Cabin"/>
-              </a:rPr>
-              <a:t> re-visit policy</a:t>
-            </a:r>
-            <a:r>
-              <a:rPr lang="en" sz="2000" u="none" strike="noStrike" cap="none" dirty="0">
-                <a:solidFill>
-                  <a:srgbClr val="FFFFFF"/>
-                </a:solidFill>
-                <a:sym typeface="Cabin"/>
-              </a:rPr>
-              <a:t> that states when to check for changes to the pages,</a:t>
+              <a:t> określa, po jakim czasie sprawdzić zmiany na stronie</a:t>
             </a:r>
           </a:p>
           <a:p>
@@ -5201,31 +5099,22 @@
               <a:buFont typeface="Cabin"/>
             </a:pPr>
             <a:r>
-              <a:rPr lang="en" sz="2000" u="none" strike="noStrike" cap="none" dirty="0">
+              <a:rPr lang="pl" sz="2000" b="0" i="0" u="none" strike="noStrike" cap="none" baseline="0" dirty="0">
+                <a:solidFill>
+                  <a:srgbClr val="00F900"/>
+                </a:solidFill>
+                <a:sym typeface="Cabin"/>
+              </a:rPr>
+              <a:t>polityka uprzejmości</a:t>
+            </a:r>
+            <a:r>
+              <a:rPr lang="pl" sz="2000" b="0" i="0" u="none" strike="noStrike" cap="none" baseline="0" dirty="0">
                 <a:solidFill>
                   <a:srgbClr val="FFFFFF"/>
                 </a:solidFill>
                 <a:sym typeface="Cabin"/>
               </a:rPr>
-              <a:t>a </a:t>
-            </a:r>
-            <a:r>
-              <a:rPr lang="en" sz="2000" u="none" strike="noStrike" cap="none" dirty="0">
-                <a:solidFill>
-                  <a:srgbClr val="00F900"/>
-                </a:solidFill>
-                <a:sym typeface="Cabin"/>
-              </a:rPr>
-              <a:t>politeness policy</a:t>
-            </a:r>
-            <a:r>
-              <a:rPr lang="en" sz="2000" u="none" strike="noStrike" cap="none" dirty="0">
-                <a:solidFill>
-                  <a:srgbClr val="FFFFFF"/>
-                </a:solidFill>
-                <a:sym typeface="Cabin"/>
-              </a:rPr>
-              <a:t> that states how to avoid overloading Web sites, and</a:t>
+              <a:t> określa, jak nie przeciążać odwiedzanych stron</a:t>
             </a:r>
           </a:p>
           <a:p>
@@ -5237,7 +5126,7 @@
               <a:buFont typeface="Cabin"/>
             </a:pPr>
             <a:r>
-              <a:rPr lang="en" sz="2000" u="none" strike="noStrike" cap="none" dirty="0">
+              <a:rPr lang="pl" sz="2000" b="0" i="0" u="none" strike="noStrike" cap="none" baseline="0" dirty="0">
                 <a:solidFill>
                   <a:srgbClr val="FFFFFF"/>
                 </a:solidFill>
@@ -5246,22 +5135,22 @@
               <a:t>a </a:t>
             </a:r>
             <a:r>
-              <a:rPr lang="en" sz="2000" u="none" strike="noStrike" cap="none" dirty="0">
+              <a:rPr lang="pl" sz="2000" b="0" i="0" u="none" strike="noStrike" cap="none" baseline="0" dirty="0">
                 <a:solidFill>
                   <a:srgbClr val="00F900"/>
                 </a:solidFill>
                 <a:sym typeface="Cabin"/>
               </a:rPr>
-              <a:t>parallelization policy</a:t>
-            </a:r>
-            <a:r>
-              <a:rPr lang="en" sz="2000" u="none" strike="noStrike" cap="none" dirty="0">
+              <a:t>polityka współdziałania</a:t>
+            </a:r>
+            <a:r>
+              <a:rPr lang="pl" sz="2000" b="0" i="0" u="none" strike="noStrike" cap="none" baseline="0" dirty="0">
                 <a:solidFill>
                   <a:srgbClr val="FFFFFF"/>
                 </a:solidFill>
                 <a:sym typeface="Cabin"/>
               </a:rPr>
-              <a:t> that states how to coordinate distributed Web crawlers</a:t>
+              <a:t> określa, jak koordynować pracę wielu robotów</a:t>
             </a:r>
           </a:p>
         </p:txBody>
@@ -5271,13 +5160,6 @@
   <p:clrMapOvr>
     <a:masterClrMapping/>
   </p:clrMapOvr>
-  <p:timing>
-    <p:tnLst>
-      <p:par>
-        <p:cTn xmlns:p14="http://schemas.microsoft.com/office/powerpoint/2010/main" id="1" dur="indefinite" restart="never" nodeType="tmRoot"/>
-      </p:par>
-    </p:tnLst>
-  </p:timing>
 </p:sld>
 </file>
 
@@ -5335,7 +5217,7 @@
               <a:buNone/>
             </a:pPr>
             <a:r>
-              <a:rPr lang="en" sz="4300" u="none" strike="noStrike" cap="none">
+              <a:rPr lang="pl" sz="4300" b="0" i="0" u="none" strike="noStrike" cap="none" baseline="0">
                 <a:solidFill>
                   <a:srgbClr val="FFD966"/>
                 </a:solidFill>
@@ -5386,13 +5268,13 @@
               <a:buFont typeface="Cabin"/>
             </a:pPr>
             <a:r>
-              <a:rPr lang="en" sz="2000" u="none" strike="noStrike" cap="none" dirty="0">
+              <a:rPr lang="pl" sz="2000" b="0" i="0" u="none" strike="noStrike" cap="none" baseline="0" dirty="0">
                 <a:solidFill>
                   <a:srgbClr val="FFFFFF"/>
                 </a:solidFill>
                 <a:sym typeface="Cabin"/>
               </a:rPr>
-              <a:t>A way for a web site to communicate with web crawlers</a:t>
+              <a:t>Sposób, w jaki strony komunikują się z robotami</a:t>
             </a:r>
           </a:p>
           <a:p>
@@ -5407,13 +5289,13 @@
               <a:buFont typeface="Cabin"/>
             </a:pPr>
             <a:r>
-              <a:rPr lang="en" sz="2000" u="none" strike="noStrike" cap="none" dirty="0">
+              <a:rPr lang="pl" sz="2000" b="0" i="0" u="none" strike="noStrike" cap="none" baseline="0" dirty="0">
                 <a:solidFill>
                   <a:srgbClr val="FFFFFF"/>
                 </a:solidFill>
                 <a:sym typeface="Cabin"/>
               </a:rPr>
-              <a:t>An informal and voluntary standard</a:t>
+              <a:t>Nieformalny, dobrowolny standard</a:t>
             </a:r>
           </a:p>
           <a:p>
@@ -5428,13 +5310,13 @@
               <a:buFont typeface="Cabin"/>
             </a:pPr>
             <a:r>
-              <a:rPr lang="en" sz="2000" u="none" strike="noStrike" cap="none" dirty="0">
+              <a:rPr lang="pl" sz="2000" b="0" i="0" u="none" strike="noStrike" cap="none" baseline="0" dirty="0">
                 <a:solidFill>
                   <a:srgbClr val="FFFFFF"/>
                 </a:solidFill>
                 <a:sym typeface="Cabin"/>
               </a:rPr>
-              <a:t>Sometimes folks make a “Spider Trap” to catch “bad” spiders</a:t>
+              <a:t>Czasami ludzie tworzą "pułapki na złe roboty":</a:t>
             </a:r>
           </a:p>
         </p:txBody>
@@ -5472,7 +5354,7 @@
               <a:buNone/>
             </a:pPr>
             <a:r>
-              <a:rPr lang="en" sz="2000" u="none" strike="noStrike" cap="none" dirty="0">
+              <a:rPr lang="pl" sz="2000" b="0" i="0" u="none" strike="noStrike" cap="none" baseline="0" dirty="0">
                 <a:solidFill>
                   <a:srgbClr val="FFFB00"/>
                 </a:solidFill>
@@ -5481,45 +5363,9 @@
                 <a:cs typeface="Arial Regular" charset="0"/>
                 <a:sym typeface="Cabin"/>
               </a:rPr>
-              <a:t>http://</a:t>
-            </a:r>
-            <a:r>
-              <a:rPr lang="en" sz="2000" u="none" strike="noStrike" cap="none" dirty="0" err="1">
-                <a:solidFill>
-                  <a:srgbClr val="FFFB00"/>
-                </a:solidFill>
-                <a:latin typeface="Arial Regular" charset="0"/>
-                <a:ea typeface="Arial Regular" charset="0"/>
-                <a:cs typeface="Arial Regular" charset="0"/>
-                <a:sym typeface="Cabin"/>
-              </a:rPr>
-              <a:t>en.wikipedia.org</a:t>
-            </a:r>
-            <a:r>
-              <a:rPr lang="en" sz="2000" u="none" strike="noStrike" cap="none" dirty="0">
-                <a:solidFill>
-                  <a:srgbClr val="FFFB00"/>
-                </a:solidFill>
-                <a:latin typeface="Arial Regular" charset="0"/>
-                <a:ea typeface="Arial Regular" charset="0"/>
-                <a:cs typeface="Arial Regular" charset="0"/>
-                <a:sym typeface="Cabin"/>
-              </a:rPr>
-              <a:t>/wiki/</a:t>
-            </a:r>
-            <a:r>
-              <a:rPr lang="en" sz="2000" u="none" strike="noStrike" cap="none" dirty="0" err="1">
-                <a:solidFill>
-                  <a:srgbClr val="FFFB00"/>
-                </a:solidFill>
-                <a:latin typeface="Arial Regular" charset="0"/>
-                <a:ea typeface="Arial Regular" charset="0"/>
-                <a:cs typeface="Arial Regular" charset="0"/>
-                <a:sym typeface="Cabin"/>
-              </a:rPr>
-              <a:t>Robots_Exclusion_Standard</a:t>
-            </a:r>
-            <a:endParaRPr lang="en" sz="2000" u="none" strike="noStrike" cap="none" dirty="0">
+              <a:t>http://en.wikipedia.org/wiki/Robots_Exclusion_Standard</a:t>
+            </a:r>
+            <a:endParaRPr lang="pl" sz="2000" u="none" strike="noStrike" cap="none" dirty="0">
               <a:solidFill>
                 <a:srgbClr val="FFFB00"/>
               </a:solidFill>
@@ -5538,7 +5384,7 @@
               <a:buNone/>
             </a:pPr>
             <a:r>
-              <a:rPr lang="en" sz="2000" u="none" strike="noStrike" cap="none" dirty="0">
+              <a:rPr lang="pl" sz="2000" b="0" i="0" u="none" strike="noStrike" cap="none" baseline="0" dirty="0">
                 <a:solidFill>
                   <a:srgbClr val="FFFB00"/>
                 </a:solidFill>
@@ -5547,45 +5393,9 @@
                 <a:cs typeface="Arial Regular" charset="0"/>
                 <a:sym typeface="Cabin"/>
               </a:rPr>
-              <a:t>http://</a:t>
-            </a:r>
-            <a:r>
-              <a:rPr lang="en" sz="2000" u="none" strike="noStrike" cap="none" dirty="0" err="1">
-                <a:solidFill>
-                  <a:srgbClr val="FFFB00"/>
-                </a:solidFill>
-                <a:latin typeface="Arial Regular" charset="0"/>
-                <a:ea typeface="Arial Regular" charset="0"/>
-                <a:cs typeface="Arial Regular" charset="0"/>
-                <a:sym typeface="Cabin"/>
-              </a:rPr>
-              <a:t>en.wikipedia.org</a:t>
-            </a:r>
-            <a:r>
-              <a:rPr lang="en" sz="2000" u="none" strike="noStrike" cap="none" dirty="0">
-                <a:solidFill>
-                  <a:srgbClr val="FFFB00"/>
-                </a:solidFill>
-                <a:latin typeface="Arial Regular" charset="0"/>
-                <a:ea typeface="Arial Regular" charset="0"/>
-                <a:cs typeface="Arial Regular" charset="0"/>
-                <a:sym typeface="Cabin"/>
-              </a:rPr>
-              <a:t>/wiki/</a:t>
-            </a:r>
-            <a:r>
-              <a:rPr lang="en" sz="2000" u="none" strike="noStrike" cap="none" dirty="0" err="1">
-                <a:solidFill>
-                  <a:srgbClr val="FFFB00"/>
-                </a:solidFill>
-                <a:latin typeface="Arial Regular" charset="0"/>
-                <a:ea typeface="Arial Regular" charset="0"/>
-                <a:cs typeface="Arial Regular" charset="0"/>
-                <a:sym typeface="Cabin"/>
-              </a:rPr>
-              <a:t>Spider_trap</a:t>
-            </a:r>
-            <a:endParaRPr lang="en" sz="2000" u="none" strike="noStrike" cap="none" dirty="0">
+              <a:t>http://en.wikipedia.org/wiki/Spider_trap</a:t>
+            </a:r>
+            <a:endParaRPr lang="pl" sz="2000" u="none" strike="noStrike" cap="none" dirty="0">
               <a:solidFill>
                 <a:srgbClr val="FFFB00"/>
               </a:solidFill>
@@ -5630,7 +5440,7 @@
               <a:buNone/>
             </a:pPr>
             <a:r>
-              <a:rPr lang="en" sz="2000" u="none" strike="noStrike" cap="none" dirty="0">
+              <a:rPr lang="pl" sz="2000" b="0" i="0" u="none" strike="noStrike" cap="none" baseline="0">
                 <a:solidFill>
                   <a:srgbClr val="00F900"/>
                 </a:solidFill>
@@ -5651,7 +5461,7 @@
               <a:buNone/>
             </a:pPr>
             <a:r>
-              <a:rPr lang="en" sz="2000" u="none" strike="noStrike" cap="none" dirty="0">
+              <a:rPr lang="pl" sz="2000" b="0" i="0" u="none" strike="noStrike" cap="none" baseline="0">
                 <a:solidFill>
                   <a:srgbClr val="00F900"/>
                 </a:solidFill>
@@ -5660,10 +5470,19 @@
                 <a:cs typeface="Arial Regular" charset="0"/>
                 <a:sym typeface="Cabin"/>
               </a:rPr>
-              <a:t>Disallow: /</a:t>
-            </a:r>
-            <a:r>
-              <a:rPr lang="en" sz="2000" u="none" strike="noStrike" cap="none" dirty="0" err="1">
+              <a:t>Disallow: /cgi-bin/</a:t>
+            </a:r>
+          </a:p>
+          <a:p>
+            <a:pPr marL="0" marR="0" lvl="0" indent="0" algn="l" rtl="0">
+              <a:spcBef>
+                <a:spcPts val="0"/>
+              </a:spcBef>
+              <a:buSzPct val="25000"/>
+              <a:buNone/>
+            </a:pPr>
+            <a:r>
+              <a:rPr lang="pl" sz="2000" b="0" i="0" u="none" strike="noStrike" cap="none" baseline="0">
                 <a:solidFill>
                   <a:srgbClr val="00F900"/>
                 </a:solidFill>
@@ -5672,10 +5491,19 @@
                 <a:cs typeface="Arial Regular" charset="0"/>
                 <a:sym typeface="Cabin"/>
               </a:rPr>
-              <a:t>cgi</a:t>
-            </a:r>
-            <a:r>
-              <a:rPr lang="en" sz="2000" u="none" strike="noStrike" cap="none" dirty="0">
+              <a:t>Disallow: /images/</a:t>
+            </a:r>
+          </a:p>
+          <a:p>
+            <a:pPr marL="0" marR="0" lvl="0" indent="0" algn="l" rtl="0">
+              <a:spcBef>
+                <a:spcPts val="0"/>
+              </a:spcBef>
+              <a:buSzPct val="25000"/>
+              <a:buNone/>
+            </a:pPr>
+            <a:r>
+              <a:rPr lang="pl" sz="2000" b="0" i="0" u="none" strike="noStrike" cap="none" baseline="0">
                 <a:solidFill>
                   <a:srgbClr val="00F900"/>
                 </a:solidFill>
@@ -5684,7 +5512,7 @@
                 <a:cs typeface="Arial Regular" charset="0"/>
                 <a:sym typeface="Cabin"/>
               </a:rPr>
-              <a:t>-bin/</a:t>
+              <a:t>Disallow: /tmp/</a:t>
             </a:r>
           </a:p>
           <a:p>
@@ -5696,73 +5524,7 @@
               <a:buNone/>
             </a:pPr>
             <a:r>
-              <a:rPr lang="en" sz="2000" u="none" strike="noStrike" cap="none" dirty="0">
-                <a:solidFill>
-                  <a:srgbClr val="00F900"/>
-                </a:solidFill>
-                <a:latin typeface="Arial Regular" charset="0"/>
-                <a:ea typeface="Arial Regular" charset="0"/>
-                <a:cs typeface="Arial Regular" charset="0"/>
-                <a:sym typeface="Cabin"/>
-              </a:rPr>
-              <a:t>Disallow: /images/</a:t>
-            </a:r>
-          </a:p>
-          <a:p>
-            <a:pPr marL="0" marR="0" lvl="0" indent="0" algn="l" rtl="0">
-              <a:spcBef>
-                <a:spcPts val="0"/>
-              </a:spcBef>
-              <a:buSzPct val="25000"/>
-              <a:buNone/>
-            </a:pPr>
-            <a:r>
-              <a:rPr lang="en" sz="2000" u="none" strike="noStrike" cap="none" dirty="0">
-                <a:solidFill>
-                  <a:srgbClr val="00F900"/>
-                </a:solidFill>
-                <a:latin typeface="Arial Regular" charset="0"/>
-                <a:ea typeface="Arial Regular" charset="0"/>
-                <a:cs typeface="Arial Regular" charset="0"/>
-                <a:sym typeface="Cabin"/>
-              </a:rPr>
-              <a:t>Disallow: /</a:t>
-            </a:r>
-            <a:r>
-              <a:rPr lang="en" sz="2000" u="none" strike="noStrike" cap="none" dirty="0" err="1">
-                <a:solidFill>
-                  <a:srgbClr val="00F900"/>
-                </a:solidFill>
-                <a:latin typeface="Arial Regular" charset="0"/>
-                <a:ea typeface="Arial Regular" charset="0"/>
-                <a:cs typeface="Arial Regular" charset="0"/>
-                <a:sym typeface="Cabin"/>
-              </a:rPr>
-              <a:t>tmp</a:t>
-            </a:r>
-            <a:r>
-              <a:rPr lang="en" sz="2000" u="none" strike="noStrike" cap="none" dirty="0">
-                <a:solidFill>
-                  <a:srgbClr val="00F900"/>
-                </a:solidFill>
-                <a:latin typeface="Arial Regular" charset="0"/>
-                <a:ea typeface="Arial Regular" charset="0"/>
-                <a:cs typeface="Arial Regular" charset="0"/>
-                <a:sym typeface="Cabin"/>
-              </a:rPr>
-              <a:t>/</a:t>
-            </a:r>
-          </a:p>
-          <a:p>
-            <a:pPr marL="0" marR="0" lvl="0" indent="0" algn="l" rtl="0">
-              <a:spcBef>
-                <a:spcPts val="0"/>
-              </a:spcBef>
-              <a:buSzPct val="25000"/>
-              <a:buNone/>
-            </a:pPr>
-            <a:r>
-              <a:rPr lang="en" sz="2000" u="none" strike="noStrike" cap="none" dirty="0">
+              <a:rPr lang="pl" sz="2000" b="0" i="0" u="none" strike="noStrike" cap="none" baseline="0">
                 <a:solidFill>
                   <a:srgbClr val="00F900"/>
                 </a:solidFill>
@@ -5781,13 +5543,6 @@
   <p:clrMapOvr>
     <a:masterClrMapping/>
   </p:clrMapOvr>
-  <p:timing>
-    <p:tnLst>
-      <p:par>
-        <p:cTn xmlns:p14="http://schemas.microsoft.com/office/powerpoint/2010/main" id="1" dur="indefinite" restart="never" nodeType="tmRoot"/>
-      </p:par>
-    </p:tnLst>
-  </p:timing>
 </p:sld>
 </file>
 
@@ -5845,13 +5600,13 @@
               <a:buNone/>
             </a:pPr>
             <a:r>
-              <a:rPr lang="en" sz="4300" u="none" strike="noStrike" cap="none">
+              <a:rPr lang="pl" sz="4300" b="0" i="0" u="none" strike="noStrike" cap="none" baseline="0">
                 <a:solidFill>
                   <a:srgbClr val="FFD966"/>
                 </a:solidFill>
                 <a:sym typeface="Cabin"/>
               </a:rPr>
-              <a:t>Google Architecture</a:t>
+              <a:t>Architektura Google</a:t>
             </a:r>
           </a:p>
         </p:txBody>
@@ -5896,13 +5651,13 @@
               <a:buFont typeface="Cabin"/>
             </a:pPr>
             <a:r>
-              <a:rPr lang="en" sz="2400" u="none" strike="noStrike" cap="none">
+              <a:rPr lang="pl" sz="2400" b="0" i="0" u="none" strike="noStrike" cap="none" baseline="0">
                 <a:solidFill>
                   <a:srgbClr val="FFFFFF"/>
                 </a:solidFill>
                 <a:sym typeface="Cabin"/>
               </a:rPr>
-              <a:t>Web Crawling</a:t>
+              <a:t>Roboty internetowe</a:t>
             </a:r>
           </a:p>
           <a:p>
@@ -5917,13 +5672,13 @@
               <a:buFont typeface="Cabin"/>
             </a:pPr>
             <a:r>
-              <a:rPr lang="en" sz="2400" u="none" strike="noStrike" cap="none">
+              <a:rPr lang="pl" sz="2400" b="0" i="0" u="none" strike="noStrike" cap="none" baseline="0">
                 <a:solidFill>
                   <a:srgbClr val="FFFB00"/>
                 </a:solidFill>
                 <a:sym typeface="Cabin"/>
               </a:rPr>
-              <a:t>Index Building</a:t>
+              <a:t>Tworzenie indeksu</a:t>
             </a:r>
           </a:p>
           <a:p>
@@ -5938,13 +5693,13 @@
               <a:buFont typeface="Cabin"/>
             </a:pPr>
             <a:r>
-              <a:rPr lang="en" sz="2400" u="none" strike="noStrike" cap="none">
+              <a:rPr lang="pl" sz="2400" b="0" i="0" u="none" strike="noStrike" cap="none" baseline="0">
                 <a:solidFill>
                   <a:srgbClr val="FFFFFF"/>
                 </a:solidFill>
                 <a:sym typeface="Cabin"/>
               </a:rPr>
-              <a:t>Searching</a:t>
+              <a:t>Wyszukiwanie</a:t>
             </a:r>
           </a:p>
         </p:txBody>
@@ -6009,7 +5764,7 @@
               <a:buNone/>
             </a:pPr>
             <a:r>
-              <a:rPr lang="en" sz="2000" u="none" strike="noStrike" cap="none" dirty="0">
+              <a:rPr lang="pl" sz="2000" b="0" i="0" u="none" strike="noStrike" cap="none" baseline="0">
                 <a:solidFill>
                   <a:srgbClr val="FFFB00"/>
                 </a:solidFill>
@@ -6018,45 +5773,9 @@
                 <a:cs typeface="Arial Regular" charset="0"/>
                 <a:sym typeface="Cabin"/>
               </a:rPr>
-              <a:t>http://</a:t>
-            </a:r>
-            <a:r>
-              <a:rPr lang="en" sz="2000" u="none" strike="noStrike" cap="none" dirty="0" err="1">
-                <a:solidFill>
-                  <a:srgbClr val="FFFB00"/>
-                </a:solidFill>
-                <a:latin typeface="Arial Regular" charset="0"/>
-                <a:ea typeface="Arial Regular" charset="0"/>
-                <a:cs typeface="Arial Regular" charset="0"/>
-                <a:sym typeface="Cabin"/>
-              </a:rPr>
-              <a:t>infolab.stanford.edu</a:t>
-            </a:r>
-            <a:r>
-              <a:rPr lang="en" sz="2000" u="none" strike="noStrike" cap="none" dirty="0">
-                <a:solidFill>
-                  <a:srgbClr val="FFFB00"/>
-                </a:solidFill>
-                <a:latin typeface="Arial Regular" charset="0"/>
-                <a:ea typeface="Arial Regular" charset="0"/>
-                <a:cs typeface="Arial Regular" charset="0"/>
-                <a:sym typeface="Cabin"/>
-              </a:rPr>
-              <a:t>/~backrub/</a:t>
-            </a:r>
-            <a:r>
-              <a:rPr lang="en" sz="2000" u="none" strike="noStrike" cap="none" dirty="0" err="1">
-                <a:solidFill>
-                  <a:srgbClr val="FFFB00"/>
-                </a:solidFill>
-                <a:latin typeface="Arial Regular" charset="0"/>
-                <a:ea typeface="Arial Regular" charset="0"/>
-                <a:cs typeface="Arial Regular" charset="0"/>
-                <a:sym typeface="Cabin"/>
-              </a:rPr>
-              <a:t>google.html</a:t>
-            </a:r>
-            <a:endParaRPr lang="en" sz="2000" u="none" strike="noStrike" cap="none" dirty="0">
+              <a:t>http://infolab.stanford.edu/~backrub/google.html</a:t>
+            </a:r>
+            <a:endParaRPr lang="pl" sz="2000" u="none" strike="noStrike" cap="none" dirty="0">
               <a:solidFill>
                 <a:srgbClr val="FFFB00"/>
               </a:solidFill>
@@ -6073,13 +5792,6 @@
   <p:clrMapOvr>
     <a:masterClrMapping/>
   </p:clrMapOvr>
-  <p:timing>
-    <p:tnLst>
-      <p:par>
-        <p:cTn xmlns:p14="http://schemas.microsoft.com/office/powerpoint/2010/main" id="1" dur="indefinite" restart="never" nodeType="tmRoot"/>
-      </p:par>
-    </p:tnLst>
-  </p:timing>
 </p:sld>
 </file>
 
@@ -6136,7 +5848,7 @@
               <a:buNone/>
             </a:pPr>
             <a:r>
-              <a:rPr lang="en" sz="2000" u="none" strike="noStrike" cap="none">
+              <a:rPr lang="pl" sz="2000" b="0" i="0" u="none" strike="noStrike" cap="none" baseline="0" dirty="0">
                 <a:solidFill>
                   <a:srgbClr val="FFFFFF"/>
                 </a:solidFill>
@@ -6145,7 +5857,7 @@
                 <a:cs typeface="Arial Regular" charset="0"/>
                 <a:sym typeface="Cabin"/>
               </a:rPr>
-              <a:t>Search engine indexing collects, parses, and stores data to facilitate fast and accurate information retrieval. The purpose of storing an index is to optimize speed and performance in finding relevant documents for a search query. Without an index, the search engine would scan every document in the corpus, which would require considerable time and computing power. </a:t>
+              <a:t>Indeksowanie przez wyszukiwarki polega na zbieraniu, przetwarzaniu i przechowywaniu danych pozwalających na szybki dostęp do informacji. Celem przechowywania indeksu jest optymalizacja szybkości i wydajności odnajdywania dokumentów odpowiadających zapytaniu. Bez indeksu wyszukiwarka musiałaby skanować każdy dokument w korpusie, co wymagałoby wiele czasu i mocy obliczeniowej. </a:t>
             </a:r>
           </a:p>
         </p:txBody>
@@ -6183,13 +5895,13 @@
               <a:buNone/>
             </a:pPr>
             <a:r>
-              <a:rPr lang="en" sz="4300" u="none" strike="noStrike" cap="none" dirty="0">
+              <a:rPr lang="pl" sz="4300" b="0" i="0" u="none" strike="noStrike" cap="none" baseline="0">
                 <a:solidFill>
                   <a:srgbClr val="FFD966"/>
                 </a:solidFill>
                 <a:sym typeface="Cabin"/>
               </a:rPr>
-              <a:t>Search Indexing</a:t>
+              <a:t>Indeksowanie wyszukiwań</a:t>
             </a:r>
           </a:p>
         </p:txBody>
@@ -6227,7 +5939,7 @@
               <a:buNone/>
             </a:pPr>
             <a:r>
-              <a:rPr lang="en" sz="2000" u="none" strike="noStrike" cap="none" dirty="0">
+              <a:rPr lang="pl" sz="2000" b="0" i="0" u="none" strike="noStrike" cap="none" baseline="0" dirty="0">
                 <a:solidFill>
                   <a:srgbClr val="FFFF00"/>
                 </a:solidFill>
@@ -6236,55 +5948,7 @@
                 <a:cs typeface="Arial Regular" charset="0"/>
                 <a:sym typeface="Cabin"/>
               </a:rPr>
-              <a:t>http://</a:t>
-            </a:r>
-            <a:r>
-              <a:rPr lang="en" sz="2000" u="none" strike="noStrike" cap="none" dirty="0" err="1">
-                <a:solidFill>
-                  <a:srgbClr val="FFFF00"/>
-                </a:solidFill>
-                <a:latin typeface="Arial Regular" charset="0"/>
-                <a:ea typeface="Arial Regular" charset="0"/>
-                <a:cs typeface="Arial Regular" charset="0"/>
-                <a:sym typeface="Cabin"/>
-              </a:rPr>
-              <a:t>en.wikipedia.org</a:t>
-            </a:r>
-            <a:r>
-              <a:rPr lang="en" sz="2000" u="none" strike="noStrike" cap="none" dirty="0">
-                <a:solidFill>
-                  <a:srgbClr val="FFFF00"/>
-                </a:solidFill>
-                <a:latin typeface="Arial Regular" charset="0"/>
-                <a:ea typeface="Arial Regular" charset="0"/>
-                <a:cs typeface="Arial Regular" charset="0"/>
-                <a:sym typeface="Cabin"/>
-              </a:rPr>
-              <a:t>/wiki/Index_(</a:t>
-            </a:r>
-            <a:r>
-              <a:rPr lang="en" sz="2000" u="none" strike="noStrike" cap="none" dirty="0" err="1">
-                <a:solidFill>
-                  <a:srgbClr val="FFFF00"/>
-                </a:solidFill>
-                <a:latin typeface="Arial Regular" charset="0"/>
-                <a:ea typeface="Arial Regular" charset="0"/>
-                <a:cs typeface="Arial Regular" charset="0"/>
-                <a:sym typeface="Cabin"/>
-              </a:rPr>
-              <a:t>search_engine</a:t>
-            </a:r>
-            <a:r>
-              <a:rPr lang="en" sz="2000" u="none" strike="noStrike" cap="none" dirty="0">
-                <a:solidFill>
-                  <a:srgbClr val="FFFF00"/>
-                </a:solidFill>
-                <a:latin typeface="Arial Regular" charset="0"/>
-                <a:ea typeface="Arial Regular" charset="0"/>
-                <a:cs typeface="Arial Regular" charset="0"/>
-                <a:sym typeface="Cabin"/>
-              </a:rPr>
-              <a:t>)</a:t>
+              <a:t>http://en.wikipedia.org/wiki/Index_(search_engine)</a:t>
             </a:r>
           </a:p>
         </p:txBody>
@@ -6294,13 +5958,6 @@
   <p:clrMapOvr>
     <a:masterClrMapping/>
   </p:clrMapOvr>
-  <p:timing>
-    <p:tnLst>
-      <p:par>
-        <p:cTn xmlns:p14="http://schemas.microsoft.com/office/powerpoint/2010/main" id="1" dur="indefinite" restart="never" nodeType="tmRoot"/>
-      </p:par>
-    </p:tnLst>
-  </p:timing>
 </p:sld>
 </file>
 
@@ -6371,7 +6028,7 @@
               <a:buNone/>
             </a:pPr>
             <a:r>
-              <a:rPr lang="en" sz="1500" u="none" strike="noStrike" cap="none">
+              <a:rPr lang="pl" sz="1500" b="0" i="0" u="none" strike="noStrike" cap="none" baseline="0">
                 <a:solidFill>
                   <a:srgbClr val="660066"/>
                 </a:solidFill>
@@ -6465,7 +6122,7 @@
               <a:buNone/>
             </a:pPr>
             <a:r>
-              <a:rPr lang="en" sz="1600" b="0" i="0" u="none" strike="noStrike" cap="none" dirty="0" err="1">
+              <a:rPr lang="pl" sz="1600" b="0" i="0" u="none" strike="noStrike" cap="none" baseline="0">
                 <a:solidFill>
                   <a:srgbClr val="FFFFFF"/>
                 </a:solidFill>
@@ -6476,7 +6133,7 @@
               </a:rPr>
               <a:t>spider.py</a:t>
             </a:r>
-            <a:endParaRPr lang="en" sz="1600" b="0" i="0" u="none" strike="noStrike" cap="none" dirty="0">
+            <a:endParaRPr lang="pl" sz="1600" b="0" i="0" u="none" strike="noStrike" cap="none" dirty="0">
               <a:solidFill>
                 <a:srgbClr val="FFFFFF"/>
               </a:solidFill>
@@ -6561,7 +6218,7 @@
               <a:buNone/>
             </a:pPr>
             <a:r>
-              <a:rPr lang="en" sz="1800" b="0" i="0" u="none" strike="noStrike" cap="none">
+              <a:rPr lang="pl" sz="1800" b="0" i="0" u="none" strike="noStrike" cap="none" baseline="0">
                 <a:solidFill>
                   <a:srgbClr val="FFFFFF"/>
                 </a:solidFill>
@@ -6608,7 +6265,7 @@
               <a:buNone/>
             </a:pPr>
             <a:r>
-              <a:rPr lang="en" sz="1000" b="0" i="0" u="none" strike="noStrike" cap="none">
+              <a:rPr lang="pl" sz="1000" b="0" i="0" u="none" strike="noStrike" cap="none" baseline="0">
                 <a:solidFill>
                   <a:srgbClr val="FFFFFF"/>
                 </a:solidFill>
@@ -6617,7 +6274,7 @@
                 <a:cs typeface="Helvetica Neue"/>
                 <a:sym typeface="Helvetica Neue"/>
               </a:rPr>
-              <a:t>(5, None, 1.0, 3, u'http://www.dr-chuck.com/csev-blog')</a:t>
+              <a:t>[5, 1.0, 3, 3]</a:t>
             </a:r>
           </a:p>
           <a:p>
@@ -6629,7 +6286,7 @@
               <a:buNone/>
             </a:pPr>
             <a:r>
-              <a:rPr lang="en" sz="1000" b="0" i="0" u="none" strike="noStrike" cap="none">
+              <a:rPr lang="pl" sz="1000" b="0" i="0" u="none" strike="noStrike" cap="none" baseline="0">
                 <a:solidFill>
                   <a:srgbClr val="FFFFFF"/>
                 </a:solidFill>
@@ -6650,7 +6307,7 @@
               <a:buNone/>
             </a:pPr>
             <a:r>
-              <a:rPr lang="en" sz="1000" b="0" i="0" u="none" strike="noStrike" cap="none">
+              <a:rPr lang="pl" sz="1000" b="0" i="0" u="none" strike="noStrike" cap="none" baseline="0">
                 <a:solidFill>
                   <a:srgbClr val="FFFFFF"/>
                 </a:solidFill>
@@ -6671,7 +6328,7 @@
               <a:buNone/>
             </a:pPr>
             <a:r>
-              <a:rPr lang="en" sz="1000" b="0" i="0" u="none" strike="noStrike" cap="none">
+              <a:rPr lang="pl" sz="1000" b="0" i="0" u="none" strike="noStrike" cap="none" baseline="0">
                 <a:solidFill>
                   <a:srgbClr val="FFFFFF"/>
                 </a:solidFill>
@@ -6692,7 +6349,7 @@
               <a:buNone/>
             </a:pPr>
             <a:r>
-              <a:rPr lang="en" sz="1000" b="0" i="0" u="none" strike="noStrike" cap="none">
+              <a:rPr lang="pl" sz="1000" b="0" i="0" u="none" strike="noStrike" cap="none" baseline="0">
                 <a:solidFill>
                   <a:srgbClr val="FFFFFF"/>
                 </a:solidFill>
@@ -6755,8 +6412,8 @@
           </p:nvSpPr>
           <p:spPr>
             <a:xfrm>
-              <a:off x="1515534" y="3289573"/>
-              <a:ext cx="946373" cy="1087476"/>
+              <a:off x="1202699" y="3289573"/>
+              <a:ext cx="1259210" cy="1087475"/>
             </a:xfrm>
             <a:prstGeom prst="rect">
               <a:avLst/>
@@ -6772,7 +6429,7 @@
             </a:bodyPr>
             <a:lstStyle/>
             <a:p>
-              <a:pPr marL="0" marR="0" lvl="0" indent="0" algn="l" rtl="0">
+              <a:pPr marL="0" marR="0" lvl="0" indent="0" algn="ctr" rtl="0">
                 <a:lnSpc>
                   <a:spcPct val="100000"/>
                 </a:lnSpc>
@@ -6790,7 +6447,7 @@
                 <a:buNone/>
               </a:pPr>
               <a:r>
-                <a:rPr lang="en" sz="1800" b="0" i="0" u="none" strike="noStrike" cap="none">
+                <a:rPr lang="pl" sz="1800" b="0" i="0" u="none" strike="noStrike" cap="none" baseline="0" dirty="0">
                   <a:solidFill>
                     <a:srgbClr val="660066"/>
                   </a:solidFill>
@@ -6799,11 +6456,11 @@
                   <a:cs typeface="Helvetica Neue"/>
                   <a:sym typeface="Helvetica Neue"/>
                 </a:rPr>
-                <a:t>The</a:t>
+                <a:t>Sieć</a:t>
               </a:r>
             </a:p>
             <a:p>
-              <a:pPr marL="0" marR="0" lvl="0" indent="0" algn="l" rtl="0">
+              <a:pPr marL="0" marR="0" lvl="0" indent="0" algn="ctr" rtl="0">
                 <a:lnSpc>
                   <a:spcPct val="100000"/>
                 </a:lnSpc>
@@ -6821,7 +6478,7 @@
                 <a:buNone/>
               </a:pPr>
               <a:r>
-                <a:rPr lang="en" sz="1800" b="0" i="0" u="none" strike="noStrike" cap="none">
+                <a:rPr lang="pl" sz="1800" b="0" i="0" u="none" strike="noStrike" cap="none" baseline="0" dirty="0">
                   <a:solidFill>
                     <a:srgbClr val="660066"/>
                   </a:solidFill>
@@ -6830,7 +6487,7 @@
                   <a:cs typeface="Helvetica Neue"/>
                   <a:sym typeface="Helvetica Neue"/>
                 </a:rPr>
-                <a:t>Web</a:t>
+                <a:t>WWW</a:t>
               </a:r>
             </a:p>
           </p:txBody>
@@ -6883,7 +6540,7 @@
               <a:buNone/>
             </a:pPr>
             <a:r>
-              <a:rPr lang="en" sz="1500" u="none" strike="noStrike" cap="none">
+              <a:rPr lang="pl" sz="1500" b="0" i="0" u="none" strike="noStrike" cap="none" baseline="0">
                 <a:solidFill>
                   <a:srgbClr val="660066"/>
                 </a:solidFill>
@@ -6944,7 +6601,7 @@
               <a:buNone/>
             </a:pPr>
             <a:r>
-              <a:rPr lang="en" sz="1500" u="none" strike="noStrike" cap="none">
+              <a:rPr lang="pl" sz="1500" b="0" i="0" u="none" strike="noStrike" cap="none" baseline="0">
                 <a:solidFill>
                   <a:srgbClr val="660066"/>
                 </a:solidFill>
@@ -6975,7 +6632,7 @@
               <a:buNone/>
             </a:pPr>
             <a:r>
-              <a:rPr lang="en" sz="1500" u="none" strike="noStrike" cap="none">
+              <a:rPr lang="pl" sz="1500" b="0" i="0" u="none" strike="noStrike" cap="none" baseline="0">
                 <a:solidFill>
                   <a:srgbClr val="660066"/>
                 </a:solidFill>
@@ -7108,7 +6765,7 @@
               <a:buNone/>
             </a:pPr>
             <a:r>
-              <a:rPr lang="en" sz="2300" b="0" i="0" u="none" strike="noStrike" cap="none" baseline="30000" dirty="0">
+              <a:rPr lang="pl" sz="2300" b="0" i="0" u="none" strike="noStrike" cap="none" baseline="30000">
                 <a:solidFill>
                   <a:srgbClr val="FFFF00"/>
                 </a:solidFill>
@@ -7117,33 +6774,9 @@
                 <a:cs typeface="Helvetica Neue"/>
                 <a:sym typeface="Helvetica Neue"/>
               </a:rPr>
-              <a:t>http://</a:t>
-            </a:r>
-            <a:r>
-              <a:rPr lang="en" sz="2300" b="0" i="0" u="none" strike="noStrike" cap="none" baseline="30000" dirty="0" smtClean="0">
-                <a:solidFill>
-                  <a:srgbClr val="FFFF00"/>
-                </a:solidFill>
-                <a:latin typeface="Helvetica Neue"/>
-                <a:ea typeface="Helvetica Neue"/>
-                <a:cs typeface="Helvetica Neue"/>
-                <a:sym typeface="Helvetica Neue"/>
-              </a:rPr>
-              <a:t>www.py4e.com/code3/</a:t>
-            </a:r>
-            <a:r>
-              <a:rPr lang="en" sz="2300" b="0" i="0" u="none" strike="noStrike" cap="none" baseline="30000" dirty="0" err="1" smtClean="0">
-                <a:solidFill>
-                  <a:srgbClr val="FFFF00"/>
-                </a:solidFill>
-                <a:latin typeface="Helvetica Neue"/>
-                <a:ea typeface="Helvetica Neue"/>
-                <a:cs typeface="Helvetica Neue"/>
-                <a:sym typeface="Helvetica Neue"/>
-              </a:rPr>
-              <a:t>pagerank.zip</a:t>
-            </a:r>
-            <a:endParaRPr lang="en" sz="2300" b="0" i="0" u="none" strike="noStrike" cap="none" baseline="30000" dirty="0">
+              <a:t>http://www.py4e.com/code3/pagerank.zip</a:t>
+            </a:r>
+            <a:endParaRPr lang="pl" sz="2300" b="0" i="0" u="none" strike="noStrike" cap="none" baseline="30000" dirty="0">
               <a:solidFill>
                 <a:srgbClr val="FFFF00"/>
               </a:solidFill>
@@ -7200,7 +6833,7 @@
               <a:buNone/>
             </a:pPr>
             <a:r>
-              <a:rPr lang="en" sz="1800" b="0" i="0" u="none" strike="noStrike" cap="none">
+              <a:rPr lang="pl" sz="1800" b="0" i="0" u="none" strike="noStrike" cap="none" baseline="0">
                 <a:solidFill>
                   <a:srgbClr val="FFFFFF"/>
                 </a:solidFill>
@@ -7259,7 +6892,7 @@
               <a:buNone/>
             </a:pPr>
             <a:r>
-              <a:rPr lang="en" sz="1800" b="0" i="0" u="none" strike="noStrike" cap="none">
+              <a:rPr lang="pl" sz="1800" b="0" i="0" u="none" strike="noStrike" cap="none" baseline="0">
                 <a:solidFill>
                   <a:srgbClr val="FFFFFF"/>
                 </a:solidFill>
@@ -7376,7 +7009,7 @@
               <a:buNone/>
             </a:pPr>
             <a:r>
-              <a:rPr lang="en" sz="1800" b="0" i="0" u="none" strike="noStrike" cap="none">
+              <a:rPr lang="pl" sz="1800" b="0" i="0" u="none" strike="noStrike" cap="none" baseline="0">
                 <a:solidFill>
                   <a:srgbClr val="FFFFFF"/>
                 </a:solidFill>
@@ -7422,13 +7055,6 @@
   <p:clrMapOvr>
     <a:masterClrMapping/>
   </p:clrMapOvr>
-  <p:timing>
-    <p:tnLst>
-      <p:par>
-        <p:cTn xmlns:p14="http://schemas.microsoft.com/office/powerpoint/2010/main" id="1" dur="indefinite" restart="never" nodeType="tmRoot"/>
-      </p:par>
-    </p:tnLst>
-  </p:timing>
 </p:sld>
 </file>
 
@@ -7461,8 +7087,8 @@
         </p:nvSpPr>
         <p:spPr>
           <a:xfrm>
-            <a:off x="650081" y="464695"/>
-            <a:ext cx="4664869" cy="963999"/>
+            <a:off x="495301" y="464695"/>
+            <a:ext cx="4819650" cy="963999"/>
           </a:xfrm>
           <a:prstGeom prst="rect">
             <a:avLst/>
@@ -7486,24 +7112,33 @@
               <a:buNone/>
             </a:pPr>
             <a:r>
-              <a:rPr lang="en" sz="3200" u="none" strike="noStrike" cap="none">
+              <a:rPr lang="pl" sz="3200" b="0" i="0" u="none" strike="noStrike" cap="none" baseline="0" dirty="0">
                 <a:solidFill>
                   <a:srgbClr val="FFD966"/>
                 </a:solidFill>
                 <a:sym typeface="Cabin"/>
               </a:rPr>
-              <a:t>Mailing Lists - </a:t>
-            </a:r>
-            <a:r>
-              <a:rPr lang="en" sz="3200" u="none" strike="noStrike" cap="none" dirty="0" err="1">
+              <a:t>Listy mailingowe </a:t>
+            </a:r>
+            <a:r>
+              <a:rPr lang="pl" sz="3200" b="0" i="0" u="none" baseline="0" dirty="0">
+                <a:solidFill>
+                  <a:srgbClr val="FFC000"/>
+                </a:solidFill>
+                <a:sym typeface="Cabin"/>
+              </a:rPr>
+              <a:t>–</a:t>
+            </a:r>
+            <a:r>
+              <a:rPr lang="pl" sz="3200" b="0" i="0" u="none" strike="noStrike" cap="none" baseline="0" dirty="0">
                 <a:solidFill>
                   <a:srgbClr val="FFD966"/>
                 </a:solidFill>
                 <a:sym typeface="Cabin"/>
               </a:rPr>
-              <a:t>Gmane</a:t>
-            </a:r>
-            <a:endParaRPr lang="en" sz="3200" u="none" strike="noStrike" cap="none" dirty="0">
+              <a:t> Gmane</a:t>
+            </a:r>
+            <a:endParaRPr lang="pl" sz="3200" u="none" strike="noStrike" cap="none" dirty="0">
               <a:solidFill>
                 <a:srgbClr val="FFD966"/>
               </a:solidFill>
@@ -7552,13 +7187,13 @@
               <a:buFont typeface="Cabin"/>
             </a:pPr>
             <a:r>
-              <a:rPr lang="en" sz="2000" u="none" strike="noStrike" cap="none" dirty="0">
+              <a:rPr lang="pl" sz="2000" b="0" i="0" u="none" strike="noStrike" cap="none" baseline="0">
                 <a:solidFill>
                   <a:srgbClr val="FFFFFF"/>
                 </a:solidFill>
                 <a:sym typeface="Cabin"/>
               </a:rPr>
-              <a:t>Crawl the archive of a mailing list</a:t>
+              <a:t>Przeskanuj archiwum listy mailingowej</a:t>
             </a:r>
           </a:p>
           <a:p>
@@ -7573,13 +7208,13 @@
               <a:buFont typeface="Cabin"/>
             </a:pPr>
             <a:r>
-              <a:rPr lang="en" sz="2000" u="none" strike="noStrike" cap="none" dirty="0">
+              <a:rPr lang="pl" sz="2000" b="0" i="0" u="none" strike="noStrike" cap="none" baseline="0">
                 <a:solidFill>
                   <a:srgbClr val="FFFFFF"/>
                 </a:solidFill>
                 <a:sym typeface="Cabin"/>
               </a:rPr>
-              <a:t>Do some analysis / cleanup</a:t>
+              <a:t>Zrób analizę/ oczyść</a:t>
             </a:r>
           </a:p>
           <a:p>
@@ -7594,13 +7229,13 @@
               <a:buFont typeface="Cabin"/>
             </a:pPr>
             <a:r>
-              <a:rPr lang="en" sz="2000" u="none" strike="noStrike" cap="none" dirty="0">
+              <a:rPr lang="pl" sz="2000" b="0" i="0" u="none" strike="noStrike" cap="none" baseline="0">
                 <a:solidFill>
                   <a:srgbClr val="FFFFFF"/>
                 </a:solidFill>
                 <a:sym typeface="Cabin"/>
               </a:rPr>
-              <a:t>Visualize the data as word cloud and lines</a:t>
+              <a:t>Zwizualizuj dane jako chmurę słów i linie</a:t>
             </a:r>
           </a:p>
         </p:txBody>
@@ -7638,7 +7273,7 @@
               <a:buNone/>
             </a:pPr>
             <a:r>
-              <a:rPr lang="en" sz="2300" b="0" i="0" u="none" strike="noStrike" cap="none" baseline="30000" dirty="0">
+              <a:rPr lang="pl" sz="2300" b="0" i="0" u="none" strike="noStrike" cap="none" baseline="30000">
                 <a:solidFill>
                   <a:srgbClr val="FFFF00"/>
                 </a:solidFill>
@@ -7647,33 +7282,9 @@
                 <a:cs typeface="Helvetica Neue"/>
                 <a:sym typeface="Helvetica Neue"/>
               </a:rPr>
-              <a:t>http://</a:t>
-            </a:r>
-            <a:r>
-              <a:rPr lang="en" sz="2300" b="0" i="0" u="none" strike="noStrike" cap="none" baseline="30000" dirty="0" smtClean="0">
-                <a:solidFill>
-                  <a:srgbClr val="FFFF00"/>
-                </a:solidFill>
-                <a:latin typeface="Helvetica Neue"/>
-                <a:ea typeface="Helvetica Neue"/>
-                <a:cs typeface="Helvetica Neue"/>
-                <a:sym typeface="Helvetica Neue"/>
-              </a:rPr>
-              <a:t>www.py4e.com/code3/</a:t>
-            </a:r>
-            <a:r>
-              <a:rPr lang="en" sz="2300" b="0" i="0" u="none" strike="noStrike" cap="none" baseline="30000" dirty="0" err="1" smtClean="0">
-                <a:solidFill>
-                  <a:srgbClr val="FFFF00"/>
-                </a:solidFill>
-                <a:latin typeface="Helvetica Neue"/>
-                <a:ea typeface="Helvetica Neue"/>
-                <a:cs typeface="Helvetica Neue"/>
-                <a:sym typeface="Helvetica Neue"/>
-              </a:rPr>
-              <a:t>gmane.zip</a:t>
-            </a:r>
-            <a:endParaRPr lang="en" sz="2300" b="0" i="0" u="none" strike="noStrike" cap="none" baseline="30000" dirty="0">
+              <a:t>http://www.py4e.com/code3/gmane.zip</a:t>
+            </a:r>
+            <a:endParaRPr lang="pl" sz="2300" b="0" i="0" u="none" strike="noStrike" cap="none" baseline="30000" dirty="0">
               <a:solidFill>
                 <a:srgbClr val="FFFF00"/>
               </a:solidFill>
@@ -7717,13 +7328,6 @@
   <p:clrMapOvr>
     <a:masterClrMapping/>
   </p:clrMapOvr>
-  <p:timing>
-    <p:tnLst>
-      <p:par>
-        <p:cTn xmlns:p14="http://schemas.microsoft.com/office/powerpoint/2010/main" id="1" dur="indefinite" restart="never" nodeType="tmRoot"/>
-      </p:par>
-    </p:tnLst>
-  </p:timing>
 </p:sld>
 </file>
 
@@ -7777,22 +7381,22 @@
               <a:buNone/>
             </a:pPr>
             <a:r>
-              <a:rPr lang="en" sz="4300" u="none" strike="noStrike" cap="none">
+              <a:rPr lang="pl" sz="4300" b="0" i="0" u="none" strike="noStrike" cap="none" baseline="0">
                 <a:solidFill>
                   <a:srgbClr val="FF0000"/>
                 </a:solidFill>
                 <a:sym typeface="Cabin"/>
               </a:rPr>
-              <a:t>Warning: </a:t>
-            </a:r>
-            <a:r>
-              <a:rPr lang="en" sz="4300" u="none" strike="noStrike" cap="none">
+              <a:t>Uwaga:  </a:t>
+            </a:r>
+            <a:r>
+              <a:rPr lang="pl" sz="4300" b="0" i="0" u="none" strike="noStrike" cap="none" baseline="0">
                 <a:solidFill>
                   <a:srgbClr val="FFD966"/>
                 </a:solidFill>
                 <a:sym typeface="Cabin"/>
               </a:rPr>
-              <a:t>This Dataset is &gt; 1GB </a:t>
+              <a:t>Zbiór danych &gt; 1GB </a:t>
             </a:r>
           </a:p>
         </p:txBody>
@@ -7840,16 +7444,16 @@
               <a:buFont typeface="Cabin"/>
             </a:pPr>
             <a:r>
-              <a:rPr lang="en" sz="2000" u="none" strike="noStrike" cap="none" dirty="0">
+              <a:rPr lang="pl" sz="2000" b="0" i="0" u="none" strike="noStrike" cap="none" baseline="0">
                 <a:solidFill>
                   <a:srgbClr val="FFFFFF"/>
                 </a:solidFill>
                 <a:sym typeface="Cabin"/>
               </a:rPr>
-              <a:t>Do not just point this application at </a:t>
-            </a:r>
-            <a:r>
-              <a:rPr lang="en" sz="2000" u="none" strike="noStrike" cap="none" dirty="0" err="1">
+              <a:t>Nie uruchamiaj tej aplikacji na </a:t>
+            </a:r>
+            <a:r>
+              <a:rPr lang="pl" sz="2000" b="0" i="0" u="none" strike="noStrike" cap="none" baseline="0">
                 <a:solidFill>
                   <a:srgbClr val="FFFF00"/>
                 </a:solidFill>
@@ -7857,25 +7461,7 @@
               </a:rPr>
               <a:t>gmane.org</a:t>
             </a:r>
-            <a:r>
-              <a:rPr lang="en" sz="2000" u="none" strike="noStrike" cap="none" dirty="0">
-                <a:solidFill>
-                  <a:srgbClr val="FFFFFF"/>
-                </a:solidFill>
-                <a:sym typeface="Cabin"/>
-              </a:rPr>
-              <a:t> and let it </a:t>
-            </a:r>
-            <a:r>
-              <a:rPr lang="en" sz="2000" u="none" strike="noStrike" cap="none" dirty="0" smtClean="0">
-                <a:solidFill>
-                  <a:srgbClr val="FFFFFF"/>
-                </a:solidFill>
-                <a:sym typeface="Cabin"/>
-              </a:rPr>
-              <a:t>run</a:t>
-            </a:r>
-            <a:endParaRPr lang="en-US" sz="2000" u="none" strike="noStrike" cap="none" dirty="0" smtClean="0">
+            <a:endParaRPr lang="pl" sz="2000" u="none" strike="noStrike" cap="none" dirty="0">
               <a:solidFill>
                 <a:srgbClr val="FFFFFF"/>
               </a:solidFill>
@@ -7897,42 +7483,15 @@
               <a:buFont typeface="Cabin"/>
             </a:pPr>
             <a:r>
-              <a:rPr lang="en" sz="2000" u="none" strike="noStrike" cap="none" dirty="0" smtClean="0">
+              <a:rPr lang="pl" sz="2000" b="0" i="0" u="none" strike="noStrike" cap="none" baseline="0">
                 <a:solidFill>
                   <a:srgbClr val="FFFFFF"/>
                 </a:solidFill>
                 <a:sym typeface="Cabin"/>
               </a:rPr>
-              <a:t>There </a:t>
-            </a:r>
-            <a:r>
-              <a:rPr lang="en" sz="2000" u="none" strike="noStrike" cap="none" dirty="0">
-                <a:solidFill>
-                  <a:srgbClr val="FFFFFF"/>
-                </a:solidFill>
-                <a:sym typeface="Cabin"/>
-              </a:rPr>
-              <a:t>is no rate limit – these are cool </a:t>
-            </a:r>
-            <a:r>
-              <a:rPr lang="en" sz="2000" u="none" strike="noStrike" cap="none" dirty="0" smtClean="0">
-                <a:solidFill>
-                  <a:srgbClr val="FFFFFF"/>
-                </a:solidFill>
-                <a:sym typeface="Cabin"/>
-              </a:rPr>
-              <a:t>folk</a:t>
-            </a:r>
-            <a:r>
-              <a:rPr lang="en-US" sz="2000" dirty="0" smtClean="0">
-                <a:solidFill>
-                  <a:srgbClr val="FFFFFF"/>
-                </a:solidFill>
-                <a:sym typeface="Cabin"/>
-              </a:rPr>
-              <a:t>s</a:t>
-            </a:r>
-            <a:endParaRPr lang="en" dirty="0"/>
+              <a:t>Nie ma limitu zapytań – miło z ich strony</a:t>
+            </a:r>
+            <a:endParaRPr lang="pl" dirty="0"/>
           </a:p>
         </p:txBody>
       </p:sp>
@@ -7961,14 +7520,14 @@
           </a:bodyPr>
           <a:lstStyle/>
           <a:p>
-            <a:pPr lvl="0" algn="ctr">
+            <a:pPr lvl="0" algn="ctr" rtl="0">
               <a:spcBef>
                 <a:spcPts val="0"/>
               </a:spcBef>
               <a:buNone/>
             </a:pPr>
             <a:r>
-              <a:rPr lang="en-US" sz="1800" dirty="0" smtClean="0">
+              <a:rPr lang="pl" sz="1800" b="0" i="0" u="none" baseline="0" dirty="0">
                 <a:solidFill>
                   <a:srgbClr val="FFFF00"/>
                 </a:solidFill>
@@ -7977,29 +7536,17 @@
                 <a:cs typeface="Courier"/>
                 <a:sym typeface="Courier New"/>
               </a:rPr>
-              <a:t>Use this for </a:t>
-            </a:r>
-            <a:r>
-              <a:rPr lang="en-US" sz="1800" smtClean="0">
-                <a:solidFill>
-                  <a:srgbClr val="FFFF00"/>
-                </a:solidFill>
-                <a:latin typeface="Courier"/>
-                <a:ea typeface="Courier New"/>
-                <a:cs typeface="Courier"/>
-                <a:sym typeface="Courier New"/>
-              </a:rPr>
-              <a:t>your testing:</a:t>
-            </a:r>
-          </a:p>
-          <a:p>
-            <a:pPr lvl="0" algn="ctr">
+              <a:t>Do testów użyj:</a:t>
+            </a:r>
+          </a:p>
+          <a:p>
+            <a:pPr lvl="0" algn="ctr" rtl="0">
               <a:spcBef>
                 <a:spcPts val="0"/>
               </a:spcBef>
               <a:buNone/>
             </a:pPr>
-            <a:endParaRPr lang="en-US" sz="1800" dirty="0" smtClean="0">
+            <a:endParaRPr lang="pl" sz="1800" dirty="0">
               <a:solidFill>
                 <a:srgbClr val="FFFF00"/>
               </a:solidFill>
@@ -8010,14 +7557,14 @@
             </a:endParaRPr>
           </a:p>
           <a:p>
-            <a:pPr lvl="0" algn="ctr">
+            <a:pPr lvl="0" algn="ctr" rtl="0">
               <a:spcBef>
                 <a:spcPts val="0"/>
               </a:spcBef>
               <a:buNone/>
             </a:pPr>
             <a:r>
-              <a:rPr lang="en" sz="1800" dirty="0" smtClean="0">
+              <a:rPr lang="pl" sz="1800" b="0" i="0" u="none" baseline="0" dirty="0">
                 <a:solidFill>
                   <a:srgbClr val="FFFF00"/>
                 </a:solidFill>
@@ -8026,67 +7573,7 @@
                 <a:cs typeface="Courier"/>
                 <a:sym typeface="Courier New"/>
               </a:rPr>
-              <a:t>http</a:t>
-            </a:r>
-            <a:r>
-              <a:rPr lang="en" sz="1800" dirty="0">
-                <a:solidFill>
-                  <a:srgbClr val="FFFF00"/>
-                </a:solidFill>
-                <a:latin typeface="Courier"/>
-                <a:ea typeface="Courier New"/>
-                <a:cs typeface="Courier"/>
-                <a:sym typeface="Courier New"/>
-              </a:rPr>
-              <a:t>://</a:t>
-            </a:r>
-            <a:r>
-              <a:rPr lang="en" sz="1800" dirty="0" err="1">
-                <a:solidFill>
-                  <a:srgbClr val="FFFF00"/>
-                </a:solidFill>
-                <a:latin typeface="Courier"/>
-                <a:ea typeface="Courier New"/>
-                <a:cs typeface="Courier"/>
-                <a:sym typeface="Courier New"/>
-              </a:rPr>
-              <a:t>mbox.dr-chuck.net</a:t>
-            </a:r>
-            <a:r>
-              <a:rPr lang="en" sz="1800" dirty="0">
-                <a:solidFill>
-                  <a:srgbClr val="FFFF00"/>
-                </a:solidFill>
-                <a:latin typeface="Courier"/>
-                <a:ea typeface="Courier New"/>
-                <a:cs typeface="Courier"/>
-                <a:sym typeface="Courier New"/>
-              </a:rPr>
-              <a:t>/</a:t>
-            </a:r>
-            <a:r>
-              <a:rPr lang="en" sz="1800" dirty="0" err="1">
-                <a:solidFill>
-                  <a:srgbClr val="FFFF00"/>
-                </a:solidFill>
-                <a:latin typeface="Courier"/>
-                <a:ea typeface="Courier New"/>
-                <a:cs typeface="Courier"/>
-                <a:sym typeface="Courier New"/>
-              </a:rPr>
-              <a:t>sakai.devel</a:t>
-            </a:r>
-            <a:r>
-              <a:rPr lang="en" sz="1800" dirty="0">
-                <a:solidFill>
-                  <a:srgbClr val="FFFF00"/>
-                </a:solidFill>
-                <a:latin typeface="Courier"/>
-                <a:ea typeface="Courier New"/>
-                <a:cs typeface="Courier"/>
-                <a:sym typeface="Courier New"/>
-              </a:rPr>
-              <a:t>/4/5</a:t>
+              <a:t>http://mbox.dr-chuck.net/sakai.devel/4/5</a:t>
             </a:r>
           </a:p>
         </p:txBody>
@@ -8096,13 +7583,6 @@
   <p:clrMapOvr>
     <a:masterClrMapping/>
   </p:clrMapOvr>
-  <p:timing>
-    <p:tnLst>
-      <p:par>
-        <p:cTn xmlns:p14="http://schemas.microsoft.com/office/powerpoint/2010/main" id="1" dur="indefinite" restart="never" nodeType="tmRoot"/>
-      </p:par>
-    </p:tnLst>
-  </p:timing>
 </p:sld>
 </file>
 
@@ -8200,7 +7680,7 @@
               <a:buNone/>
             </a:pPr>
             <a:r>
-              <a:rPr lang="en" sz="1500" u="none" strike="noStrike" cap="none" dirty="0" err="1">
+              <a:rPr lang="pl" sz="1500" b="0" i="0" u="none" strike="noStrike" cap="none" baseline="0">
                 <a:solidFill>
                   <a:srgbClr val="660066"/>
                 </a:solidFill>
@@ -8211,7 +7691,7 @@
               </a:rPr>
               <a:t>content.sqlite</a:t>
             </a:r>
-            <a:endParaRPr lang="en" sz="1500" u="none" strike="noStrike" cap="none" dirty="0">
+            <a:endParaRPr lang="pl" sz="1500" u="none" strike="noStrike" cap="none" dirty="0">
               <a:solidFill>
                 <a:srgbClr val="660066"/>
               </a:solidFill>
@@ -8302,7 +7782,7 @@
               <a:buNone/>
             </a:pPr>
             <a:r>
-              <a:rPr lang="en" sz="1800" b="0" i="0" u="none" strike="noStrike" cap="none">
+              <a:rPr lang="pl" sz="1800" b="0" i="0" u="none" strike="noStrike" cap="none" baseline="0">
                 <a:solidFill>
                   <a:srgbClr val="FFFFFF"/>
                 </a:solidFill>
@@ -8377,7 +7857,7 @@
               <a:buNone/>
             </a:pPr>
             <a:r>
-              <a:rPr lang="en" sz="1000" b="0" i="0" u="none" strike="noStrike" cap="none">
+              <a:rPr lang="pl" sz="1000" b="0" i="0" u="none" strike="noStrike" cap="none" baseline="0">
                 <a:solidFill>
                   <a:srgbClr val="FFFFFF"/>
                 </a:solidFill>
@@ -8398,7 +7878,7 @@
               <a:buNone/>
             </a:pPr>
             <a:r>
-              <a:rPr lang="en" sz="1000" b="0" i="0" u="none" strike="noStrike" cap="none">
+              <a:rPr lang="pl" sz="1000" b="0" i="0" u="none" strike="noStrike" cap="none" baseline="0">
                 <a:solidFill>
                   <a:srgbClr val="FFFFFF"/>
                 </a:solidFill>
@@ -8419,7 +7899,7 @@
               <a:buNone/>
             </a:pPr>
             <a:r>
-              <a:rPr lang="en" sz="1000" b="0" i="0" u="none" strike="noStrike" cap="none">
+              <a:rPr lang="pl" sz="1000" b="0" i="0" u="none" strike="noStrike" cap="none" baseline="0">
                 <a:solidFill>
                   <a:srgbClr val="FFFFFF"/>
                 </a:solidFill>
@@ -8440,7 +7920,7 @@
               <a:buNone/>
             </a:pPr>
             <a:r>
-              <a:rPr lang="en" sz="1000" b="0" i="0" u="none" strike="noStrike" cap="none">
+              <a:rPr lang="pl" sz="1000" b="0" i="0" u="none" strike="noStrike" cap="none" baseline="0">
                 <a:solidFill>
                   <a:srgbClr val="FFFFFF"/>
                 </a:solidFill>
@@ -8461,7 +7941,7 @@
               <a:buNone/>
             </a:pPr>
             <a:r>
-              <a:rPr lang="en" sz="1000" b="0" i="0" u="none" strike="noStrike" cap="none">
+              <a:rPr lang="pl" sz="1000" b="0" i="0" u="none" strike="noStrike" cap="none" baseline="0">
                 <a:solidFill>
                   <a:srgbClr val="FFFFFF"/>
                 </a:solidFill>
@@ -8482,7 +7962,7 @@
               <a:buNone/>
             </a:pPr>
             <a:r>
-              <a:rPr lang="en" sz="1000" b="0" i="0" u="none" strike="noStrike" cap="none">
+              <a:rPr lang="pl" sz="1000" b="0" i="0" u="none" strike="noStrike" cap="none" baseline="0">
                 <a:solidFill>
                   <a:srgbClr val="FFFFFF"/>
                 </a:solidFill>
@@ -8503,7 +7983,7 @@
               <a:buNone/>
             </a:pPr>
             <a:r>
-              <a:rPr lang="en" sz="1000" b="0" i="0" u="none" strike="noStrike" cap="none">
+              <a:rPr lang="pl" sz="1000" b="0" i="0" u="none" strike="noStrike" cap="none" baseline="0">
                 <a:solidFill>
                   <a:srgbClr val="FFFFFF"/>
                 </a:solidFill>
@@ -8524,7 +8004,7 @@
               <a:buNone/>
             </a:pPr>
             <a:r>
-              <a:rPr lang="en" sz="1000" b="0" i="0" u="none" strike="noStrike" cap="none">
+              <a:rPr lang="pl" sz="1000" b="0" i="0" u="none" strike="noStrike" cap="none" baseline="0">
                 <a:solidFill>
                   <a:srgbClr val="FFFFFF"/>
                 </a:solidFill>
@@ -8545,7 +8025,7 @@
               <a:buNone/>
             </a:pPr>
             <a:r>
-              <a:rPr lang="en" sz="1000" b="0" i="0" u="none" strike="noStrike" cap="none">
+              <a:rPr lang="pl" sz="1000" b="0" i="0" u="none" strike="noStrike" cap="none" baseline="0">
                 <a:solidFill>
                   <a:srgbClr val="FFFFFF"/>
                 </a:solidFill>
@@ -8628,7 +8108,7 @@
               <a:buNone/>
             </a:pPr>
             <a:r>
-              <a:rPr lang="en" dirty="0" err="1">
+              <a:rPr lang="pl" b="0" i="0" u="none" baseline="0">
                 <a:solidFill>
                   <a:srgbClr val="660066"/>
                 </a:solidFill>
@@ -8639,7 +8119,7 @@
               </a:rPr>
               <a:t>mbox.dr-chuck.net</a:t>
             </a:r>
-            <a:endParaRPr lang="en" dirty="0">
+            <a:endParaRPr lang="pl" dirty="0">
               <a:solidFill>
                 <a:srgbClr val="660066"/>
               </a:solidFill>
@@ -8698,7 +8178,7 @@
               <a:buNone/>
             </a:pPr>
             <a:r>
-              <a:rPr lang="en" sz="1500" u="none" strike="noStrike" cap="none">
+              <a:rPr lang="pl" sz="1500" b="0" i="0" u="none" strike="noStrike" cap="none" baseline="0">
                 <a:solidFill>
                   <a:srgbClr val="660066"/>
                 </a:solidFill>
@@ -8759,7 +8239,7 @@
               <a:buNone/>
             </a:pPr>
             <a:r>
-              <a:rPr lang="en" sz="1500" u="none" strike="noStrike" cap="none">
+              <a:rPr lang="pl" sz="1500" b="0" i="0" u="none" strike="noStrike" cap="none" baseline="0">
                 <a:solidFill>
                   <a:srgbClr val="660066"/>
                 </a:solidFill>
@@ -8770,7 +8250,7 @@
               </a:rPr>
               <a:t>gword.htm</a:t>
             </a:r>
-            <a:endParaRPr lang="en" sz="1500" u="none" strike="noStrike" cap="none" dirty="0">
+            <a:endParaRPr lang="pl" sz="1500" u="none" strike="noStrike" cap="none" dirty="0">
               <a:solidFill>
                 <a:srgbClr val="660066"/>
               </a:solidFill>
@@ -8799,7 +8279,7 @@
               <a:buNone/>
             </a:pPr>
             <a:r>
-              <a:rPr lang="en" sz="1500" u="none" strike="noStrike" cap="none" dirty="0">
+              <a:rPr lang="pl" sz="1500" b="0" i="0" u="none" strike="noStrike" cap="none" baseline="0">
                 <a:solidFill>
                   <a:srgbClr val="660066"/>
                 </a:solidFill>
@@ -8931,7 +8411,7 @@
               <a:buNone/>
             </a:pPr>
             <a:r>
-              <a:rPr lang="en" sz="2300" b="0" i="0" u="none" strike="noStrike" cap="none" baseline="30000">
+              <a:rPr lang="pl" sz="2300" b="0" i="0" u="none" strike="noStrike" cap="none" baseline="30000">
                 <a:solidFill>
                   <a:srgbClr val="FFFF00"/>
                 </a:solidFill>
@@ -8940,33 +8420,9 @@
                 <a:cs typeface="Helvetica Neue"/>
                 <a:sym typeface="Helvetica Neue"/>
               </a:rPr>
-              <a:t>http://</a:t>
-            </a:r>
-            <a:r>
-              <a:rPr lang="en" sz="2300" b="0" i="0" u="none" strike="noStrike" cap="none" baseline="30000" smtClean="0">
-                <a:solidFill>
-                  <a:srgbClr val="FFFF00"/>
-                </a:solidFill>
-                <a:latin typeface="Helvetica Neue"/>
-                <a:ea typeface="Helvetica Neue"/>
-                <a:cs typeface="Helvetica Neue"/>
-                <a:sym typeface="Helvetica Neue"/>
-              </a:rPr>
-              <a:t>www.py4e.com/code3/</a:t>
-            </a:r>
-            <a:r>
-              <a:rPr lang="en" sz="2300" b="0" i="0" u="none" strike="noStrike" cap="none" baseline="30000" dirty="0" err="1" smtClean="0">
-                <a:solidFill>
-                  <a:srgbClr val="FFFF00"/>
-                </a:solidFill>
-                <a:latin typeface="Helvetica Neue"/>
-                <a:ea typeface="Helvetica Neue"/>
-                <a:cs typeface="Helvetica Neue"/>
-                <a:sym typeface="Helvetica Neue"/>
-              </a:rPr>
-              <a:t>gmane.zip</a:t>
-            </a:r>
-            <a:endParaRPr lang="en" sz="2300" b="0" i="0" u="none" strike="noStrike" cap="none" baseline="30000" dirty="0">
+              <a:t>http://www.py4e.com/code3/gmane.zip</a:t>
+            </a:r>
+            <a:endParaRPr lang="pl" sz="2300" b="0" i="0" u="none" strike="noStrike" cap="none" baseline="30000" dirty="0">
               <a:solidFill>
                 <a:srgbClr val="FFFF00"/>
               </a:solidFill>
@@ -9023,7 +8479,7 @@
               <a:buNone/>
             </a:pPr>
             <a:r>
-              <a:rPr lang="en" sz="1800" b="0" i="0" u="none" strike="noStrike" cap="none">
+              <a:rPr lang="pl" sz="1800" b="0" i="0" u="none" strike="noStrike" cap="none" baseline="0">
                 <a:solidFill>
                   <a:srgbClr val="FFFFFF"/>
                 </a:solidFill>
@@ -9034,7 +8490,7 @@
               </a:rPr>
               <a:t>gword.py</a:t>
             </a:r>
-            <a:endParaRPr lang="en" sz="1800" b="0" i="0" u="none" strike="noStrike" cap="none" dirty="0">
+            <a:endParaRPr lang="pl" sz="1800" b="0" i="0" u="none" strike="noStrike" cap="none" dirty="0">
               <a:solidFill>
                 <a:srgbClr val="FFFFFF"/>
               </a:solidFill>
@@ -9091,7 +8547,7 @@
               <a:buNone/>
             </a:pPr>
             <a:r>
-              <a:rPr lang="en" sz="1800" b="0" i="0" u="none" strike="noStrike" cap="none">
+              <a:rPr lang="pl" sz="1800" b="0" i="0" u="none" strike="noStrike" cap="none" baseline="0">
                 <a:solidFill>
                   <a:srgbClr val="FFFFFF"/>
                 </a:solidFill>
@@ -9150,7 +8606,7 @@
               <a:buNone/>
             </a:pPr>
             <a:r>
-              <a:rPr lang="en" sz="1800" b="0" i="0" u="none" strike="noStrike" cap="none">
+              <a:rPr lang="pl" sz="1800" b="0" i="0" u="none" strike="noStrike" cap="none" baseline="0">
                 <a:solidFill>
                   <a:srgbClr val="FFFFFF"/>
                 </a:solidFill>
@@ -9267,7 +8723,7 @@
               <a:buNone/>
             </a:pPr>
             <a:r>
-              <a:rPr lang="en" sz="1500" u="none" strike="noStrike" cap="none">
+              <a:rPr lang="pl" sz="1500" b="0" i="0" u="none" strike="noStrike" cap="none" baseline="0">
                 <a:solidFill>
                   <a:srgbClr val="660066"/>
                 </a:solidFill>
@@ -9328,7 +8784,7 @@
               <a:buNone/>
             </a:pPr>
             <a:r>
-              <a:rPr lang="en" sz="1500" u="none" strike="noStrike" cap="none">
+              <a:rPr lang="pl" sz="1500" b="0" i="0" u="none" strike="noStrike" cap="none" baseline="0">
                 <a:solidFill>
                   <a:srgbClr val="660066"/>
                 </a:solidFill>
@@ -9359,7 +8815,7 @@
               <a:buNone/>
             </a:pPr>
             <a:r>
-              <a:rPr lang="en" sz="1500" u="none" strike="noStrike" cap="none">
+              <a:rPr lang="pl" sz="1500" b="0" i="0" u="none" strike="noStrike" cap="none" baseline="0">
                 <a:solidFill>
                   <a:srgbClr val="660066"/>
                 </a:solidFill>
@@ -9475,7 +8931,7 @@
               <a:buNone/>
             </a:pPr>
             <a:r>
-              <a:rPr lang="en" sz="1800">
+              <a:rPr lang="pl" sz="1800" b="0" i="0" u="none" baseline="0">
                 <a:solidFill>
                   <a:srgbClr val="FFFFFF"/>
                 </a:solidFill>
@@ -9487,7 +8943,7 @@
               <a:t>gline</a:t>
             </a:r>
             <a:r>
-              <a:rPr lang="en" sz="1800" b="0" i="0" u="none" strike="noStrike" cap="none">
+              <a:rPr lang="pl" sz="1800" b="0" i="0" u="none" strike="noStrike" cap="none" baseline="0">
                 <a:solidFill>
                   <a:srgbClr val="FFFFFF"/>
                 </a:solidFill>
@@ -9561,14 +9017,14 @@
           </a:bodyPr>
           <a:lstStyle/>
           <a:p>
-            <a:pPr lvl="0" algn="ctr">
+            <a:pPr lvl="0" algn="ctr" rtl="0">
               <a:buClr>
                 <a:srgbClr val="660066"/>
               </a:buClr>
               <a:buSzPct val="25000"/>
             </a:pPr>
             <a:r>
-              <a:rPr lang="en" sz="1500" dirty="0" err="1">
+              <a:rPr lang="pl" sz="1500" b="0" i="0" u="none" baseline="0">
                 <a:solidFill>
                   <a:srgbClr val="660066"/>
                 </a:solidFill>
@@ -9579,7 +9035,7 @@
               </a:rPr>
               <a:t>content.sqlite</a:t>
             </a:r>
-            <a:endParaRPr lang="en" sz="1500" dirty="0">
+            <a:endParaRPr lang="pl" sz="1500" dirty="0">
               <a:solidFill>
                 <a:srgbClr val="660066"/>
               </a:solidFill>
@@ -9641,7 +9097,7 @@
               <a:buNone/>
             </a:pPr>
             <a:r>
-              <a:rPr lang="en-US" sz="1500" u="none" strike="noStrike" cap="none" dirty="0" smtClean="0">
+              <a:rPr lang="pl" sz="1500" b="0" i="0" u="none" strike="noStrike" cap="none" baseline="0">
                 <a:solidFill>
                   <a:srgbClr val="660066"/>
                 </a:solidFill>
@@ -9650,33 +9106,9 @@
                 <a:cs typeface="Arial Regular" charset="0"/>
                 <a:sym typeface="Cabin"/>
               </a:rPr>
-              <a:t>mapping</a:t>
-            </a:r>
-            <a:r>
-              <a:rPr lang="en" sz="1500" u="none" strike="noStrike" cap="none" dirty="0" smtClean="0">
-                <a:solidFill>
-                  <a:srgbClr val="660066"/>
-                </a:solidFill>
-                <a:latin typeface="Arial Regular" charset="0"/>
-                <a:ea typeface="Arial Regular" charset="0"/>
-                <a:cs typeface="Arial Regular" charset="0"/>
-                <a:sym typeface="Cabin"/>
-              </a:rPr>
-              <a:t>.</a:t>
-            </a:r>
-            <a:r>
-              <a:rPr lang="en" sz="1500" u="none" strike="noStrike" cap="none" dirty="0" err="1" smtClean="0">
-                <a:solidFill>
-                  <a:srgbClr val="660066"/>
-                </a:solidFill>
-                <a:latin typeface="Arial Regular" charset="0"/>
-                <a:ea typeface="Arial Regular" charset="0"/>
-                <a:cs typeface="Arial Regular" charset="0"/>
-                <a:sym typeface="Cabin"/>
-              </a:rPr>
-              <a:t>sqlite</a:t>
-            </a:r>
-            <a:endParaRPr lang="en" sz="1500" u="none" strike="noStrike" cap="none" dirty="0">
+              <a:t>mapping.sqlite</a:t>
+            </a:r>
+            <a:endParaRPr lang="pl" sz="1500" u="none" strike="noStrike" cap="none" dirty="0">
               <a:solidFill>
                 <a:srgbClr val="660066"/>
               </a:solidFill>
@@ -9730,7 +9162,7 @@
   <p:cSld>
     <p:spTree>
       <p:nvGrpSpPr>
-        <p:cNvPr id="1" name="Shape 319"/>
+        <p:cNvPr id="1" name="Shape 793"/>
         <p:cNvGrpSpPr/>
         <p:nvPr/>
       </p:nvGrpSpPr>
@@ -9744,7 +9176,7 @@
       </p:grpSpPr>
       <p:sp>
         <p:nvSpPr>
-          <p:cNvPr id="320" name="Shape 320"/>
+          <p:cNvPr id="794" name="Shape 794"/>
           <p:cNvSpPr txBox="1">
             <a:spLocks noGrp="1"/>
           </p:cNvSpPr>
@@ -9754,301 +9186,34 @@
         </p:nvSpPr>
         <p:spPr>
           <a:xfrm>
-            <a:off x="822766" y="599008"/>
-            <a:ext cx="7129021" cy="381569"/>
+            <a:off x="822769" y="532210"/>
+            <a:ext cx="7013925" cy="456307"/>
           </a:xfrm>
           <a:prstGeom prst="rect">
             <a:avLst/>
           </a:prstGeom>
-          <a:noFill/>
-          <a:ln>
-            <a:noFill/>
-          </a:ln>
         </p:spPr>
         <p:txBody>
-          <a:bodyPr lIns="51425" tIns="51425" rIns="51425" bIns="51425" anchor="ctr" anchorCtr="0">
+          <a:bodyPr lIns="51427" tIns="51427" rIns="51427" bIns="51427" anchor="ctr" anchorCtr="0">
             <a:noAutofit/>
           </a:bodyPr>
           <a:lstStyle/>
           <a:p>
-            <a:pPr marL="0" marR="0" lvl="0" indent="0" algn="ctr" rtl="0">
-              <a:spcBef>
-                <a:spcPts val="0"/>
-              </a:spcBef>
-              <a:buClr>
-                <a:srgbClr val="00FF00"/>
-              </a:buClr>
-              <a:buSzPct val="25000"/>
-              <a:buFont typeface="Cabin"/>
-              <a:buNone/>
-            </a:pPr>
-            <a:r>
-              <a:rPr lang="en" sz="2000" u="none" strike="noStrike" cap="none">
-                <a:solidFill>
-                  <a:srgbClr val="FFFF00"/>
-                </a:solidFill>
-                <a:sym typeface="Cabin"/>
-              </a:rPr>
-              <a:t>Acknowledgements / Contributions</a:t>
-            </a:r>
-          </a:p>
-        </p:txBody>
-      </p:sp>
-      <p:sp>
-        <p:nvSpPr>
-          <p:cNvPr id="321" name="Shape 321"/>
-          <p:cNvSpPr txBox="1"/>
-          <p:nvPr/>
-        </p:nvSpPr>
-        <p:spPr>
-          <a:xfrm>
-            <a:off x="678431" y="1205845"/>
-            <a:ext cx="3823705" cy="3299480"/>
-          </a:xfrm>
-          <a:prstGeom prst="rect">
-            <a:avLst/>
-          </a:prstGeom>
-          <a:noFill/>
-          <a:ln>
-            <a:noFill/>
-          </a:ln>
-        </p:spPr>
-        <p:txBody>
-          <a:bodyPr lIns="51425" tIns="51425" rIns="51425" bIns="51425" anchor="t" anchorCtr="0">
-            <a:noAutofit/>
-          </a:bodyPr>
-          <a:lstStyle/>
-          <a:p>
-            <a:pPr marL="0" marR="0" lvl="0" indent="0" algn="l" rtl="0">
-              <a:spcBef>
-                <a:spcPts val="0"/>
-              </a:spcBef>
-              <a:buClr>
-                <a:srgbClr val="FFFFFF"/>
-              </a:buClr>
-              <a:buSzPct val="25000"/>
-              <a:buFont typeface="Helvetica Neue"/>
-              <a:buNone/>
-            </a:pPr>
-            <a:r>
-              <a:rPr lang="en" sz="1000" b="0" i="0" u="none" strike="noStrike" cap="none" dirty="0" err="1" smtClean="0">
-                <a:solidFill>
-                  <a:srgbClr val="FFFFFF"/>
-                </a:solidFill>
-                <a:latin typeface="Helvetica Neue"/>
-                <a:ea typeface="Helvetica Neue"/>
-                <a:cs typeface="Helvetica Neue"/>
-                <a:sym typeface="Helvetica Neue"/>
-              </a:rPr>
-              <a:t>Thes</a:t>
-            </a:r>
-            <a:r>
-              <a:rPr lang="en-US" sz="1000" b="0" i="0" u="none" strike="noStrike" cap="none" dirty="0" smtClean="0">
-                <a:solidFill>
-                  <a:srgbClr val="FFFFFF"/>
-                </a:solidFill>
-                <a:latin typeface="Helvetica Neue"/>
-                <a:ea typeface="Helvetica Neue"/>
-                <a:cs typeface="Helvetica Neue"/>
-                <a:sym typeface="Helvetica Neue"/>
-              </a:rPr>
-              <a:t>e</a:t>
-            </a:r>
-            <a:r>
-              <a:rPr lang="en" sz="1000" b="0" i="0" u="none" strike="noStrike" cap="none" dirty="0" smtClean="0">
-                <a:solidFill>
-                  <a:srgbClr val="FFFFFF"/>
-                </a:solidFill>
-                <a:latin typeface="Helvetica Neue"/>
-                <a:ea typeface="Helvetica Neue"/>
-                <a:cs typeface="Helvetica Neue"/>
-                <a:sym typeface="Helvetica Neue"/>
-              </a:rPr>
-              <a:t> slide</a:t>
-            </a:r>
-            <a:r>
-              <a:rPr lang="en-US" sz="1000" b="0" i="0" u="none" strike="noStrike" cap="none" smtClean="0">
-                <a:solidFill>
-                  <a:srgbClr val="FFFFFF"/>
-                </a:solidFill>
-                <a:latin typeface="Helvetica Neue"/>
-                <a:ea typeface="Helvetica Neue"/>
-                <a:cs typeface="Helvetica Neue"/>
-                <a:sym typeface="Helvetica Neue"/>
-              </a:rPr>
-              <a:t>s</a:t>
-            </a:r>
-            <a:r>
-              <a:rPr lang="en" sz="1000" b="0" i="0" u="none" strike="noStrike" cap="none" smtClean="0">
-                <a:solidFill>
-                  <a:srgbClr val="FFFFFF"/>
-                </a:solidFill>
-                <a:latin typeface="Helvetica Neue"/>
-                <a:ea typeface="Helvetica Neue"/>
-                <a:cs typeface="Helvetica Neue"/>
-                <a:sym typeface="Helvetica Neue"/>
-              </a:rPr>
-              <a:t> </a:t>
-            </a:r>
-            <a:r>
-              <a:rPr lang="en" sz="1000" b="0" i="0" u="none" strike="noStrike" cap="none" dirty="0">
-                <a:solidFill>
-                  <a:srgbClr val="FFFFFF"/>
-                </a:solidFill>
-                <a:latin typeface="Helvetica Neue"/>
-                <a:ea typeface="Helvetica Neue"/>
-                <a:cs typeface="Helvetica Neue"/>
-                <a:sym typeface="Helvetica Neue"/>
-              </a:rPr>
-              <a:t>are Copyright 2010-  Charles R. Severance (</a:t>
-            </a:r>
-            <a:r>
-              <a:rPr lang="en" sz="1000" b="0" i="0" u="sng" strike="noStrike" cap="none" dirty="0">
-                <a:solidFill>
-                  <a:srgbClr val="FFFF00"/>
-                </a:solidFill>
-                <a:latin typeface="Helvetica Neue"/>
-                <a:ea typeface="Helvetica Neue"/>
-                <a:cs typeface="Helvetica Neue"/>
-                <a:sym typeface="Helvetica Neue"/>
-                <a:hlinkClick r:id="rId3"/>
-              </a:rPr>
-              <a:t>www.dr-chuck.com</a:t>
-            </a:r>
-            <a:r>
-              <a:rPr lang="en" sz="1000" b="0" i="0" u="none" strike="noStrike" cap="none" dirty="0">
-                <a:solidFill>
-                  <a:srgbClr val="FFFFFF"/>
-                </a:solidFill>
-                <a:latin typeface="Helvetica Neue"/>
-                <a:ea typeface="Helvetica Neue"/>
-                <a:cs typeface="Helvetica Neue"/>
-                <a:sym typeface="Helvetica Neue"/>
-              </a:rPr>
-              <a:t>) of the University of Michigan School of Information and </a:t>
-            </a:r>
-            <a:r>
-              <a:rPr lang="en" sz="1000" b="0" i="0" u="sng" strike="noStrike" cap="none" dirty="0">
-                <a:solidFill>
-                  <a:srgbClr val="FFFF00"/>
-                </a:solidFill>
-                <a:latin typeface="Helvetica Neue"/>
-                <a:ea typeface="Helvetica Neue"/>
-                <a:cs typeface="Helvetica Neue"/>
-                <a:sym typeface="Helvetica Neue"/>
-                <a:hlinkClick r:id="rId4"/>
-              </a:rPr>
-              <a:t>open.umich.edu</a:t>
-            </a:r>
-            <a:r>
-              <a:rPr lang="en" sz="1000" b="0" i="0" u="none" strike="noStrike" cap="none" dirty="0">
-                <a:solidFill>
-                  <a:srgbClr val="FFFFFF"/>
-                </a:solidFill>
-                <a:latin typeface="Helvetica Neue"/>
-                <a:ea typeface="Helvetica Neue"/>
-                <a:cs typeface="Helvetica Neue"/>
-                <a:sym typeface="Helvetica Neue"/>
-              </a:rPr>
-              <a:t> and made available under a Creative Commons Attribution 4.0 License.  Please maintain this last slide in all copies of the document to comply with the attribution requirements of the license.  If you make a change, feel free to add your name and organization to the list of contributors on this page as you republish the materials.</a:t>
-            </a:r>
-          </a:p>
-          <a:p>
-            <a:pPr marL="0" marR="0" lvl="0" indent="0" algn="l" rtl="0">
-              <a:spcBef>
-                <a:spcPts val="0"/>
-              </a:spcBef>
-              <a:buFont typeface="Helvetica Neue"/>
-              <a:buNone/>
-            </a:pPr>
-            <a:endParaRPr sz="1000" b="0" i="0" u="none" strike="noStrike" cap="none" dirty="0">
-              <a:solidFill>
-                <a:srgbClr val="FFFFFF"/>
-              </a:solidFill>
-              <a:latin typeface="Helvetica Neue"/>
-              <a:ea typeface="Helvetica Neue"/>
-              <a:cs typeface="Helvetica Neue"/>
-              <a:sym typeface="Helvetica Neue"/>
-            </a:endParaRPr>
-          </a:p>
-          <a:p>
-            <a:pPr marL="0" marR="0" lvl="0" indent="0" algn="l" rtl="0">
-              <a:spcBef>
-                <a:spcPts val="0"/>
-              </a:spcBef>
-              <a:buClr>
-                <a:srgbClr val="FFFFFF"/>
-              </a:buClr>
-              <a:buSzPct val="25000"/>
-              <a:buFont typeface="Helvetica Neue"/>
-              <a:buNone/>
-            </a:pPr>
-            <a:r>
-              <a:rPr lang="en" sz="1000" b="0" i="0" u="none" strike="noStrike" cap="none" dirty="0">
-                <a:solidFill>
-                  <a:srgbClr val="FFFFFF"/>
-                </a:solidFill>
-                <a:latin typeface="Helvetica Neue"/>
-                <a:ea typeface="Helvetica Neue"/>
-                <a:cs typeface="Helvetica Neue"/>
-                <a:sym typeface="Helvetica Neue"/>
-              </a:rPr>
-              <a:t>Initial Development: Charles Severance, University of Michigan School of Information</a:t>
-            </a:r>
-          </a:p>
-          <a:p>
-            <a:pPr marL="0" marR="0" lvl="0" indent="0" algn="l" rtl="0">
-              <a:spcBef>
-                <a:spcPts val="0"/>
-              </a:spcBef>
-              <a:buFont typeface="Helvetica Neue"/>
-              <a:buNone/>
-            </a:pPr>
-            <a:endParaRPr sz="1000" b="0" i="0" u="none" strike="noStrike" cap="none" dirty="0">
-              <a:solidFill>
-                <a:srgbClr val="FFFFFF"/>
-              </a:solidFill>
-              <a:latin typeface="Helvetica Neue"/>
-              <a:ea typeface="Helvetica Neue"/>
-              <a:cs typeface="Helvetica Neue"/>
-              <a:sym typeface="Helvetica Neue"/>
-            </a:endParaRPr>
-          </a:p>
-          <a:p>
-            <a:pPr marL="0" marR="0" lvl="0" indent="0" algn="l" rtl="0">
-              <a:spcBef>
-                <a:spcPts val="0"/>
-              </a:spcBef>
-              <a:buClr>
-                <a:srgbClr val="FFFFFF"/>
-              </a:buClr>
-              <a:buSzPct val="25000"/>
-              <a:buFont typeface="Helvetica Neue"/>
-              <a:buNone/>
-            </a:pPr>
-            <a:r>
-              <a:rPr lang="en" sz="1000" b="0" i="0" u="none" strike="noStrike" cap="none" dirty="0">
-                <a:solidFill>
-                  <a:srgbClr val="FFFFFF"/>
-                </a:solidFill>
-                <a:latin typeface="Helvetica Neue"/>
-                <a:ea typeface="Helvetica Neue"/>
-                <a:cs typeface="Helvetica Neue"/>
-                <a:sym typeface="Helvetica Neue"/>
-              </a:rPr>
-              <a:t>… Insert new Contributors here</a:t>
+            <a:r>
+              <a:rPr lang="pl" sz="2025"/>
+              <a:t>Podziękowania dla współpracowników</a:t>
             </a:r>
           </a:p>
         </p:txBody>
       </p:sp>
       <p:pic>
         <p:nvPicPr>
-          <p:cNvPr id="322" name="Shape 322"/>
+          <p:cNvPr id="797" name="Shape 797"/>
           <p:cNvPicPr preferRelativeResize="0"/>
           <p:nvPr/>
         </p:nvPicPr>
         <p:blipFill rotWithShape="1">
-          <a:blip r:embed="rId5">
+          <a:blip r:embed="rId3">
             <a:alphaModFix/>
           </a:blip>
           <a:srcRect/>
@@ -10056,8 +9221,8 @@
         </p:blipFill>
         <p:spPr>
           <a:xfrm>
-            <a:off x="246318" y="504365"/>
-            <a:ext cx="576449" cy="576449"/>
+            <a:off x="246319" y="472219"/>
+            <a:ext cx="576450" cy="576450"/>
           </a:xfrm>
           <a:prstGeom prst="rect">
             <a:avLst/>
@@ -10070,12 +9235,12 @@
       </p:pic>
       <p:pic>
         <p:nvPicPr>
-          <p:cNvPr id="323" name="Shape 323"/>
+          <p:cNvPr id="798" name="Shape 798"/>
           <p:cNvPicPr preferRelativeResize="0"/>
           <p:nvPr/>
         </p:nvPicPr>
         <p:blipFill rotWithShape="1">
-          <a:blip r:embed="rId6">
+          <a:blip r:embed="rId4">
             <a:alphaModFix/>
           </a:blip>
           <a:srcRect/>
@@ -10083,8 +9248,8 @@
         </p:blipFill>
         <p:spPr>
           <a:xfrm>
-            <a:off x="7817449" y="604603"/>
-            <a:ext cx="1107336" cy="375974"/>
+            <a:off x="7817449" y="572456"/>
+            <a:ext cx="1107337" cy="375975"/>
           </a:xfrm>
           <a:prstGeom prst="rect">
             <a:avLst/>
@@ -10097,14 +9262,14 @@
       </p:pic>
       <p:sp>
         <p:nvSpPr>
-          <p:cNvPr id="324" name="Shape 324"/>
+          <p:cNvPr id="799" name="Shape 799"/>
           <p:cNvSpPr txBox="1"/>
           <p:nvPr/>
         </p:nvSpPr>
         <p:spPr>
           <a:xfrm>
-            <a:off x="4896225" y="1279237"/>
-            <a:ext cx="3823705" cy="3226088"/>
+            <a:off x="4896225" y="1247091"/>
+            <a:ext cx="3823706" cy="3167747"/>
           </a:xfrm>
           <a:prstGeom prst="rect">
             <a:avLst/>
@@ -10115,33 +9280,200 @@
           </a:ln>
         </p:spPr>
         <p:txBody>
-          <a:bodyPr lIns="51425" tIns="51425" rIns="51425" bIns="51425" anchor="t" anchorCtr="0">
+          <a:bodyPr lIns="51427" tIns="51427" rIns="51427" bIns="51427" anchor="t" anchorCtr="0">
             <a:noAutofit/>
           </a:bodyPr>
           <a:lstStyle/>
           <a:p>
-            <a:pPr marL="0" marR="0" lvl="0" indent="0" algn="l" rtl="0">
-              <a:spcBef>
-                <a:spcPts val="0"/>
-              </a:spcBef>
-              <a:buClr>
+            <a:r>
+              <a:rPr lang="pl" sz="1013">
+                <a:solidFill>
+                  <a:srgbClr val="FFFFFF"/>
+                </a:solidFill>
+              </a:rPr>
+              <a:t>...</a:t>
+            </a:r>
+          </a:p>
+        </p:txBody>
+      </p:sp>
+      <p:sp>
+        <p:nvSpPr>
+          <p:cNvPr id="7" name="Shape 502">
+            <a:extLst>
+              <a:ext uri="{FF2B5EF4-FFF2-40B4-BE49-F238E27FC236}">
+                <a16:creationId xmlns:a16="http://schemas.microsoft.com/office/drawing/2014/main" id="{CEF5E0F8-6601-4183-B7F6-313E4C9DD536}"/>
+              </a:ext>
+            </a:extLst>
+          </p:cNvPr>
+          <p:cNvSpPr txBox="1"/>
+          <p:nvPr/>
+        </p:nvSpPr>
+        <p:spPr>
+          <a:xfrm>
+            <a:off x="678431" y="1291569"/>
+            <a:ext cx="3823706" cy="3112552"/>
+          </a:xfrm>
+          <a:prstGeom prst="rect">
+            <a:avLst/>
+          </a:prstGeom>
+          <a:noFill/>
+          <a:ln>
+            <a:noFill/>
+          </a:ln>
+        </p:spPr>
+        <p:txBody>
+          <a:bodyPr lIns="51427" tIns="51427" rIns="51427" bIns="51427" anchor="t" anchorCtr="0">
+            <a:noAutofit/>
+          </a:bodyPr>
+          <a:lstStyle/>
+          <a:p>
+            <a:r>
+              <a:rPr lang="pl" sz="1013" dirty="0">
+                <a:solidFill>
+                  <a:srgbClr val="FFFFFF"/>
+                </a:solidFill>
+              </a:rPr>
+              <a:t>Copyright slajdów 2010 - Charles R. Severance </a:t>
+            </a:r>
+            <a:br>
+              <a:rPr lang="pl" sz="1013" dirty="0">
+                <a:solidFill>
+                  <a:srgbClr val="FFFFFF"/>
+                </a:solidFill>
+              </a:rPr>
+            </a:br>
+            <a:r>
+              <a:rPr lang="pl" sz="1013" dirty="0">
+                <a:solidFill>
+                  <a:srgbClr val="FFFFFF"/>
+                </a:solidFill>
+              </a:rPr>
+              <a:t>(</a:t>
+            </a:r>
+            <a:r>
+              <a:rPr lang="pl" sz="1013" u="sng" dirty="0">
+                <a:solidFill>
+                  <a:srgbClr val="FFFF00"/>
+                </a:solidFill>
+                <a:hlinkClick r:id="rId5"/>
+              </a:rPr>
+              <a:t>www.dr-chuck.com</a:t>
+            </a:r>
+            <a:r>
+              <a:rPr lang="pl" sz="1013" dirty="0">
+                <a:solidFill>
+                  <a:srgbClr val="FFFFFF"/>
+                </a:solidFill>
+              </a:rPr>
+              <a:t>)</a:t>
+            </a:r>
+            <a:r>
+              <a:rPr lang="pl" sz="1013" dirty="0">
+                <a:solidFill>
+                  <a:schemeClr val="bg1"/>
+                </a:solidFill>
+              </a:rPr>
+              <a:t> University of Michigan School of Information i</a:t>
+            </a:r>
+            <a:r>
+              <a:rPr lang="pl" sz="1013" dirty="0">
+                <a:solidFill>
+                  <a:srgbClr val="FFFF00"/>
+                </a:solidFill>
+              </a:rPr>
+              <a:t> </a:t>
+            </a:r>
+            <a:r>
+              <a:rPr lang="pl" sz="1013" u="sng" dirty="0">
+                <a:solidFill>
+                  <a:srgbClr val="FFFF00"/>
+                </a:solidFill>
+                <a:hlinkClick r:id="rId6"/>
+              </a:rPr>
+              <a:t>open.umich.edu</a:t>
+            </a:r>
+            <a:r>
+              <a:rPr lang="pl" sz="1013" dirty="0">
+                <a:solidFill>
+                  <a:srgbClr val="FFFF00"/>
+                </a:solidFill>
+              </a:rPr>
+              <a:t> </a:t>
+            </a:r>
+            <a:r>
+              <a:rPr lang="pl" sz="1013" dirty="0">
+                <a:solidFill>
+                  <a:srgbClr val="FFFFFF"/>
+                </a:solidFill>
+              </a:rPr>
+              <a:t>dostępne na licencji Creative Commons Attribution 4.0.  Aby zachować zgodność z wymaganiami licencji należy pozostawić ten slajd na końcu każdej kopii tego dokumentu.  Po dokonaniu zmian, przy ponownej publikacji tych materiałów można dodać swoje nazwisko i nazwę organizacji do listy współpracowników</a:t>
+            </a:r>
+          </a:p>
+          <a:p>
+            <a:endParaRPr sz="1013" dirty="0">
+              <a:solidFill>
                 <a:srgbClr val="FFFFFF"/>
-              </a:buClr>
-              <a:buSzPct val="25000"/>
-              <a:buFont typeface="Helvetica Neue"/>
-              <a:buNone/>
-            </a:pPr>
-            <a:r>
-              <a:rPr lang="en" sz="1000" b="0" i="0" u="none" strike="noStrike" cap="none">
+              </a:solidFill>
+            </a:endParaRPr>
+          </a:p>
+          <a:p>
+            <a:r>
+              <a:rPr lang="pl" sz="1013" dirty="0">
                 <a:solidFill>
                   <a:srgbClr val="FFFFFF"/>
                 </a:solidFill>
-                <a:latin typeface="Helvetica Neue"/>
-                <a:ea typeface="Helvetica Neue"/>
-                <a:cs typeface="Helvetica Neue"/>
-                <a:sym typeface="Helvetica Neue"/>
-              </a:rPr>
-              <a:t>...</a:t>
+              </a:rPr>
+              <a:t>Autorstwo pierwszej wersji: Charles Severance, University of Michigan School of Information</a:t>
+            </a:r>
+          </a:p>
+          <a:p>
+            <a:endParaRPr sz="1013" dirty="0">
+              <a:solidFill>
+                <a:srgbClr val="FFFFFF"/>
+              </a:solidFill>
+            </a:endParaRPr>
+          </a:p>
+          <a:p>
+            <a:r>
+              <a:rPr lang="pl" sz="1013" dirty="0">
+                <a:solidFill>
+                  <a:srgbClr val="FFFFFF"/>
+                </a:solidFill>
+              </a:rPr>
+              <a:t>Tłumaczenie</a:t>
+            </a:r>
+            <a:r>
+              <a:rPr lang="pl" sz="1013">
+                <a:solidFill>
+                  <a:srgbClr val="FFFFFF"/>
+                </a:solidFill>
+              </a:rPr>
+              <a:t>: Agata i Krzysztof Wierzbiccy</a:t>
+            </a:r>
+            <a:r>
+              <a:rPr lang="pl" sz="1013" dirty="0">
+                <a:solidFill>
+                  <a:srgbClr val="FFFFFF"/>
+                </a:solidFill>
+              </a:rPr>
+              <a:t>, EnglishT.eu </a:t>
+            </a:r>
+          </a:p>
+          <a:p>
+            <a:endParaRPr lang="pl" sz="1013" dirty="0">
+              <a:solidFill>
+                <a:srgbClr val="FFFFFF"/>
+              </a:solidFill>
+            </a:endParaRPr>
+          </a:p>
+          <a:p>
+            <a:r>
+              <a:rPr lang="pl" sz="1013" dirty="0">
+                <a:solidFill>
+                  <a:srgbClr val="FFFFFF"/>
+                </a:solidFill>
+              </a:rPr>
+              <a:t>... wstaw tu nowych współpracowników i tłumaczy</a:t>
             </a:r>
           </a:p>
         </p:txBody>
@@ -10230,13 +9562,13 @@
               <a:buNone/>
             </a:pPr>
             <a:r>
-              <a:rPr lang="en" sz="4300" u="none" strike="noStrike" cap="none">
+              <a:rPr lang="pl" sz="4300" b="0" i="0" u="none" strike="noStrike" cap="none" baseline="0">
                 <a:solidFill>
                   <a:srgbClr val="FFD966"/>
                 </a:solidFill>
                 <a:sym typeface="Cabin"/>
               </a:rPr>
-              <a:t>Multi-Step Data Analysis</a:t>
+              <a:t>Etapy analizy danych</a:t>
             </a:r>
           </a:p>
         </p:txBody>
@@ -10489,7 +9821,7 @@
               <a:buNone/>
             </a:pPr>
             <a:r>
-              <a:rPr lang="en" sz="2000" b="0" i="0" u="none" strike="noStrike" cap="none">
+              <a:rPr lang="pl" b="0" i="0" u="none" strike="noStrike" cap="none" baseline="0" dirty="0">
                 <a:solidFill>
                   <a:srgbClr val="FFFFFF"/>
                 </a:solidFill>
@@ -10498,8 +9830,17 @@
                 <a:cs typeface="Helvetica Neue"/>
                 <a:sym typeface="Helvetica Neue"/>
               </a:rPr>
-              <a:t>Gather</a:t>
-            </a:r>
+              <a:t>Zbieranie</a:t>
+            </a:r>
+            <a:endParaRPr lang="pl" sz="2000" b="0" i="0" u="none" strike="noStrike" cap="none" baseline="0" dirty="0">
+              <a:solidFill>
+                <a:srgbClr val="FFFFFF"/>
+              </a:solidFill>
+              <a:latin typeface="Helvetica Neue"/>
+              <a:ea typeface="Helvetica Neue"/>
+              <a:cs typeface="Helvetica Neue"/>
+              <a:sym typeface="Helvetica Neue"/>
+            </a:endParaRPr>
           </a:p>
         </p:txBody>
       </p:sp>
@@ -10605,7 +9946,7 @@
               <a:buNone/>
             </a:pPr>
             <a:r>
-              <a:rPr lang="en" sz="2000" b="0" i="0" u="none" strike="noStrike" cap="none">
+              <a:rPr lang="pl" sz="2000" b="0" i="0" u="none" strike="noStrike" cap="none" baseline="0">
                 <a:solidFill>
                   <a:srgbClr val="FFFFFF"/>
                 </a:solidFill>
@@ -10614,7 +9955,7 @@
                 <a:cs typeface="Helvetica Neue"/>
                 <a:sym typeface="Helvetica Neue"/>
               </a:rPr>
-              <a:t>Analyze</a:t>
+              <a:t>Analiza</a:t>
             </a:r>
           </a:p>
         </p:txBody>
@@ -10664,7 +10005,7 @@
               <a:buNone/>
             </a:pPr>
             <a:r>
-              <a:rPr lang="en" sz="2000" b="0" i="0" u="none" strike="noStrike" cap="none">
+              <a:rPr lang="pl" b="0" i="0" u="none" strike="noStrike" cap="none" baseline="0" dirty="0">
                 <a:solidFill>
                   <a:srgbClr val="FFFFFF"/>
                 </a:solidFill>
@@ -10673,8 +10014,17 @@
                 <a:cs typeface="Helvetica Neue"/>
                 <a:sym typeface="Helvetica Neue"/>
               </a:rPr>
-              <a:t>Visualize</a:t>
-            </a:r>
+              <a:t>Wizualizacja</a:t>
+            </a:r>
+            <a:endParaRPr lang="pl" sz="2000" b="0" i="0" u="none" strike="noStrike" cap="none" baseline="0" dirty="0">
+              <a:solidFill>
+                <a:srgbClr val="FFFFFF"/>
+              </a:solidFill>
+              <a:latin typeface="Helvetica Neue"/>
+              <a:ea typeface="Helvetica Neue"/>
+              <a:cs typeface="Helvetica Neue"/>
+              <a:sym typeface="Helvetica Neue"/>
+            </a:endParaRPr>
           </a:p>
         </p:txBody>
       </p:sp>
@@ -10687,7 +10037,7 @@
         <p:spPr>
           <a:xfrm>
             <a:off x="3405187" y="2812256"/>
-            <a:ext cx="1746299" cy="369299"/>
+            <a:ext cx="1746299" cy="565394"/>
           </a:xfrm>
           <a:prstGeom prst="rect">
             <a:avLst/>
@@ -10723,7 +10073,7 @@
               <a:buNone/>
             </a:pPr>
             <a:r>
-              <a:rPr lang="en" sz="2000" b="0" i="0" u="none" strike="noStrike" cap="none">
+              <a:rPr lang="pl" sz="2000" b="0" i="0" u="none" strike="noStrike" cap="none" baseline="0" dirty="0">
                 <a:solidFill>
                   <a:srgbClr val="FFFFFF"/>
                 </a:solidFill>
@@ -10732,7 +10082,7 @@
                 <a:cs typeface="Helvetica Neue"/>
                 <a:sym typeface="Helvetica Neue"/>
               </a:rPr>
-              <a:t>Clean/Process</a:t>
+              <a:t>Czyszczenie/ Przetwarzanie</a:t>
             </a:r>
           </a:p>
         </p:txBody>
@@ -10770,7 +10120,7 @@
               <a:buNone/>
             </a:pPr>
             <a:r>
-              <a:rPr lang="en" sz="1000" b="0" i="0" u="none" strike="noStrike" cap="none">
+              <a:rPr lang="pl" sz="1000" b="0" i="0" u="none" strike="noStrike" cap="none" baseline="0">
                 <a:solidFill>
                   <a:srgbClr val="FFFFFF"/>
                 </a:solidFill>
@@ -10791,7 +10141,7 @@
               <a:buNone/>
             </a:pPr>
             <a:r>
-              <a:rPr lang="en" sz="1000" b="0" i="0" u="none" strike="noStrike" cap="none">
+              <a:rPr lang="pl" sz="1000" b="0" i="0" u="none" strike="noStrike" cap="none" baseline="0">
                 <a:solidFill>
                   <a:srgbClr val="FFFFFF"/>
                 </a:solidFill>
@@ -10812,7 +10162,7 @@
               <a:buNone/>
             </a:pPr>
             <a:r>
-              <a:rPr lang="en" sz="1000" b="0" i="0" u="none" strike="noStrike" cap="none">
+              <a:rPr lang="pl" sz="1000" b="0" i="0" u="none" strike="noStrike" cap="none" baseline="0">
                 <a:solidFill>
                   <a:srgbClr val="FFFFFF"/>
                 </a:solidFill>
@@ -10833,7 +10183,7 @@
               <a:buNone/>
             </a:pPr>
             <a:r>
-              <a:rPr lang="en" sz="1000" b="0" i="0" u="none" strike="noStrike" cap="none">
+              <a:rPr lang="pl" sz="1000" b="0" i="0" u="none" strike="noStrike" cap="none" baseline="0">
                 <a:solidFill>
                   <a:srgbClr val="FFFFFF"/>
                 </a:solidFill>
@@ -10854,7 +10204,7 @@
               <a:buNone/>
             </a:pPr>
             <a:r>
-              <a:rPr lang="en" sz="1000" b="0" i="0" u="none" strike="noStrike" cap="none">
+              <a:rPr lang="pl" sz="1000" b="0" i="0" u="none" strike="noStrike" cap="none" baseline="0">
                 <a:solidFill>
                   <a:srgbClr val="FFFFFF"/>
                 </a:solidFill>
@@ -10877,7 +10227,7 @@
         <p:spPr>
           <a:xfrm>
             <a:off x="697706" y="1810296"/>
-            <a:ext cx="789090" cy="611705"/>
+            <a:ext cx="943300" cy="611705"/>
           </a:xfrm>
           <a:prstGeom prst="rect">
             <a:avLst/>
@@ -10911,7 +10261,7 @@
               <a:buNone/>
             </a:pPr>
             <a:r>
-              <a:rPr lang="en" sz="1800" b="0" i="0" u="none" strike="noStrike" cap="none">
+              <a:rPr lang="pl" sz="1800" b="0" i="0" u="none" strike="noStrike" cap="none" baseline="0" dirty="0">
                 <a:solidFill>
                   <a:srgbClr val="660066"/>
                 </a:solidFill>
@@ -10920,7 +10270,7 @@
                 <a:cs typeface="Helvetica Neue"/>
                 <a:sym typeface="Helvetica Neue"/>
               </a:rPr>
-              <a:t>Data </a:t>
+              <a:t>Źródło</a:t>
             </a:r>
           </a:p>
           <a:p>
@@ -10942,7 +10292,7 @@
               <a:buNone/>
             </a:pPr>
             <a:r>
-              <a:rPr lang="en" sz="1800" b="0" i="0" u="none" strike="noStrike" cap="none">
+              <a:rPr lang="pl" sz="1800" b="0" i="0" u="none" strike="noStrike" cap="none" baseline="0" dirty="0">
                 <a:solidFill>
                   <a:srgbClr val="660066"/>
                 </a:solidFill>
@@ -10951,7 +10301,7 @@
                 <a:cs typeface="Helvetica Neue"/>
                 <a:sym typeface="Helvetica Neue"/>
               </a:rPr>
-              <a:t>Source</a:t>
+              <a:t>danych</a:t>
             </a:r>
           </a:p>
         </p:txBody>
@@ -10961,13 +10311,6 @@
   <p:clrMapOvr>
     <a:masterClrMapping/>
   </p:clrMapOvr>
-  <p:timing>
-    <p:tnLst>
-      <p:par>
-        <p:cTn xmlns:p14="http://schemas.microsoft.com/office/powerpoint/2010/main" id="1" dur="indefinite" restart="never" nodeType="tmRoot"/>
-      </p:par>
-    </p:tnLst>
-  </p:timing>
 </p:sld>
 </file>
 
@@ -11021,13 +10364,13 @@
               <a:buNone/>
             </a:pPr>
             <a:r>
-              <a:rPr lang="en" sz="3600" u="none" strike="noStrike" cap="none" dirty="0">
+              <a:rPr lang="pl" sz="3600" b="0" i="0" u="none" strike="noStrike" cap="none" baseline="0">
                 <a:solidFill>
                   <a:srgbClr val="FFD966"/>
                 </a:solidFill>
                 <a:sym typeface="Cabin"/>
               </a:rPr>
-              <a:t>Many Data Mining Technologies</a:t>
+              <a:t>Wiele technologii ekstrakcji danych</a:t>
             </a:r>
           </a:p>
         </p:txBody>
@@ -11072,7 +10415,7 @@
               <a:buFont typeface="Cabin"/>
             </a:pPr>
             <a:r>
-              <a:rPr lang="en" sz="3200" u="none" strike="noStrike" cap="none" baseline="30000">
+              <a:rPr lang="pl" sz="3200" b="0" i="0" u="none" strike="noStrike" cap="none" baseline="30000">
                 <a:solidFill>
                   <a:srgbClr val="FFFFFF"/>
                 </a:solidFill>
@@ -11093,7 +10436,7 @@
               <a:buFont typeface="Cabin"/>
             </a:pPr>
             <a:r>
-              <a:rPr lang="en" sz="3200" u="none" strike="noStrike" cap="none" baseline="30000">
+              <a:rPr lang="pl" sz="3200" b="0" i="0" u="none" strike="noStrike" cap="none" baseline="30000">
                 <a:solidFill>
                   <a:srgbClr val="FFFFFF"/>
                 </a:solidFill>
@@ -11114,7 +10457,7 @@
               <a:buFont typeface="Cabin"/>
             </a:pPr>
             <a:r>
-              <a:rPr lang="en" sz="3200" u="none" strike="noStrike" cap="none" baseline="30000">
+              <a:rPr lang="pl" sz="3200" b="0" i="0" u="none" strike="noStrike" cap="none" baseline="30000">
                 <a:solidFill>
                   <a:srgbClr val="FFFFFF"/>
                 </a:solidFill>
@@ -11135,7 +10478,7 @@
               <a:buFont typeface="Cabin"/>
             </a:pPr>
             <a:r>
-              <a:rPr lang="en" sz="3200" u="none" strike="noStrike" cap="none" baseline="30000">
+              <a:rPr lang="pl" sz="3200" b="0" i="0" u="none" strike="noStrike" cap="none" baseline="30000">
                 <a:solidFill>
                   <a:srgbClr val="FFFFFF"/>
                 </a:solidFill>
@@ -11156,7 +10499,7 @@
               <a:buFont typeface="Cabin"/>
             </a:pPr>
             <a:r>
-              <a:rPr lang="en" sz="3200" u="none" strike="noStrike" cap="none" baseline="30000">
+              <a:rPr lang="pl" sz="3200" b="0" i="0" u="none" strike="noStrike" cap="none" baseline="30000">
                 <a:solidFill>
                   <a:srgbClr val="FFFFFF"/>
                 </a:solidFill>
@@ -11172,13 +10515,6 @@
   <p:clrMapOvr>
     <a:masterClrMapping/>
   </p:clrMapOvr>
-  <p:timing>
-    <p:tnLst>
-      <p:par>
-        <p:cTn xmlns:p14="http://schemas.microsoft.com/office/powerpoint/2010/main" id="1" dur="indefinite" restart="never" nodeType="tmRoot"/>
-      </p:par>
-    </p:tnLst>
-  </p:timing>
 </p:sld>
 </file>
 
@@ -11232,13 +10568,13 @@
               <a:buNone/>
             </a:pPr>
             <a:r>
-              <a:rPr lang="en" sz="4300" u="none" strike="noStrike" cap="none">
+              <a:rPr lang="pl" sz="4300" b="0" i="0" u="none" strike="noStrike" cap="none" baseline="0">
                 <a:solidFill>
                   <a:srgbClr val="FFD966"/>
                 </a:solidFill>
                 <a:sym typeface="Cabin"/>
               </a:rPr>
-              <a:t>"Personal Data Mining"</a:t>
+              <a:t>"Pobieranie na własny użytek"</a:t>
             </a:r>
           </a:p>
         </p:txBody>
@@ -11283,13 +10619,31 @@
               <a:buNone/>
             </a:pPr>
             <a:r>
-              <a:rPr lang="en" sz="2000" u="none" strike="noStrike" cap="none" dirty="0">
+              <a:rPr lang="pl" sz="2000" b="0" i="0" u="none" strike="noStrike" cap="none" baseline="0" dirty="0">
                 <a:solidFill>
                   <a:srgbClr val="FFFFFF"/>
                 </a:solidFill>
                 <a:sym typeface="Cabin"/>
               </a:rPr>
-              <a:t>Our goal is to make you better programmers – not to make you data mining experts</a:t>
+              <a:t>Naszym celem jest zostanie lepszymi programistami </a:t>
+            </a:r>
+            <a:r>
+              <a:rPr lang="pl" sz="2000" b="0" i="0" u="none" baseline="0" dirty="0">
+                <a:solidFill>
+                  <a:srgbClr val="FFFFFF"/>
+                </a:solidFill>
+                <a:sym typeface="Cabin"/>
+              </a:rPr>
+              <a:t>–</a:t>
+            </a:r>
+            <a:r>
+              <a:rPr lang="pl" sz="2000" b="0" i="0" u="none" strike="noStrike" cap="none" baseline="0" dirty="0">
+                <a:solidFill>
+                  <a:srgbClr val="FFFFFF"/>
+                </a:solidFill>
+                <a:sym typeface="Cabin"/>
+              </a:rPr>
+              <a:t> nie ekspertami w pozyskiwaniu danych</a:t>
             </a:r>
           </a:p>
         </p:txBody>
@@ -11299,13 +10653,6 @@
   <p:clrMapOvr>
     <a:masterClrMapping/>
   </p:clrMapOvr>
-  <p:timing>
-    <p:tnLst>
-      <p:par>
-        <p:cTn xmlns:p14="http://schemas.microsoft.com/office/powerpoint/2010/main" id="1" dur="indefinite" restart="never" nodeType="tmRoot"/>
-      </p:par>
-    </p:tnLst>
-  </p:timing>
 </p:sld>
 </file>
 
@@ -11359,7 +10706,7 @@
               <a:buNone/>
             </a:pPr>
             <a:r>
-              <a:rPr lang="en" sz="4300" u="none" strike="noStrike" cap="none">
+              <a:rPr lang="pl" sz="4300" b="0" i="0" u="none" strike="noStrike" cap="none" baseline="0">
                 <a:solidFill>
                   <a:srgbClr val="FFD966"/>
                 </a:solidFill>
@@ -11410,13 +10757,13 @@
               <a:buFont typeface="Cabin"/>
             </a:pPr>
             <a:r>
-              <a:rPr lang="en" sz="2000" u="none" strike="noStrike" cap="none" dirty="0">
+              <a:rPr lang="pl" sz="1800" b="0" i="0" u="none" strike="noStrike" cap="none" baseline="0" dirty="0">
                 <a:solidFill>
                   <a:srgbClr val="FFFFFF"/>
                 </a:solidFill>
                 <a:sym typeface="Cabin"/>
               </a:rPr>
-              <a:t>Makes a Google Map from user entered data</a:t>
+              <a:t>Budowanie mapy Google z danych wprowadzonych przez użytkowników</a:t>
             </a:r>
           </a:p>
           <a:p>
@@ -11431,31 +10778,13 @@
               <a:buFont typeface="Cabin"/>
             </a:pPr>
             <a:r>
-              <a:rPr lang="en" sz="2000" u="none" strike="noStrike" cap="none" dirty="0">
+              <a:rPr lang="pl" sz="1800" b="0" i="0" u="none" strike="noStrike" cap="none" baseline="0" dirty="0">
                 <a:solidFill>
                   <a:srgbClr val="FFFFFF"/>
                 </a:solidFill>
                 <a:sym typeface="Cabin"/>
               </a:rPr>
-              <a:t>Uses the Google </a:t>
-            </a:r>
-            <a:r>
-              <a:rPr lang="en" sz="2000" u="none" strike="noStrike" cap="none" dirty="0" err="1">
-                <a:solidFill>
-                  <a:srgbClr val="FFFFFF"/>
-                </a:solidFill>
-                <a:sym typeface="Cabin"/>
-              </a:rPr>
-              <a:t>Geodata</a:t>
-            </a:r>
-            <a:r>
-              <a:rPr lang="en" sz="2000" u="none" strike="noStrike" cap="none" dirty="0">
-                <a:solidFill>
-                  <a:srgbClr val="FFFFFF"/>
-                </a:solidFill>
-                <a:sym typeface="Cabin"/>
-              </a:rPr>
-              <a:t> API</a:t>
+              <a:t>Wykorzystuje API Google Geodata</a:t>
             </a:r>
           </a:p>
           <a:p>
@@ -11470,13 +10799,13 @@
               <a:buFont typeface="Cabin"/>
             </a:pPr>
             <a:r>
-              <a:rPr lang="en" sz="2000" u="none" strike="noStrike" cap="none" dirty="0">
+              <a:rPr lang="pl" sz="1800" b="0" i="0" u="none" strike="noStrike" cap="none" baseline="0" dirty="0">
                 <a:solidFill>
                   <a:srgbClr val="FFFFFF"/>
                 </a:solidFill>
                 <a:sym typeface="Cabin"/>
               </a:rPr>
-              <a:t>Caches data in a database to avoid rate limiting and allow restarting</a:t>
+              <a:t>Zapisuje dane w bazie, aby unikać limitu zapytań i pozwalać na wznawianie pobierania</a:t>
             </a:r>
           </a:p>
           <a:p>
@@ -11491,13 +10820,13 @@
               <a:buFont typeface="Cabin"/>
             </a:pPr>
             <a:r>
-              <a:rPr lang="en" sz="2000" u="none" strike="noStrike" cap="none" dirty="0">
+              <a:rPr lang="pl" sz="1800" b="0" i="0" u="none" strike="noStrike" cap="none" baseline="0" dirty="0">
                 <a:solidFill>
                   <a:srgbClr val="FFFFFF"/>
                 </a:solidFill>
                 <a:sym typeface="Cabin"/>
               </a:rPr>
-              <a:t>Visualized in a browser using the Google Maps API</a:t>
+              <a:t>Wizualizacja w przeglądarce przy użyciu API Google Maps</a:t>
             </a:r>
           </a:p>
         </p:txBody>
@@ -11562,7 +10891,7 @@
               <a:buNone/>
             </a:pPr>
             <a:r>
-              <a:rPr lang="en" sz="2300" b="0" i="0" u="none" strike="noStrike" cap="none" baseline="30000" dirty="0">
+              <a:rPr lang="pl" sz="2300" b="0" i="0" u="none" strike="noStrike" cap="none" baseline="30000">
                 <a:solidFill>
                   <a:srgbClr val="FFFF00"/>
                 </a:solidFill>
@@ -11571,33 +10900,9 @@
                 <a:cs typeface="Helvetica Neue"/>
                 <a:sym typeface="Helvetica Neue"/>
               </a:rPr>
-              <a:t>http://</a:t>
-            </a:r>
-            <a:r>
-              <a:rPr lang="en" sz="2300" b="0" i="0" u="none" strike="noStrike" cap="none" baseline="30000" dirty="0" smtClean="0">
-                <a:solidFill>
-                  <a:srgbClr val="FFFF00"/>
-                </a:solidFill>
-                <a:latin typeface="Helvetica Neue"/>
-                <a:ea typeface="Helvetica Neue"/>
-                <a:cs typeface="Helvetica Neue"/>
-                <a:sym typeface="Helvetica Neue"/>
-              </a:rPr>
-              <a:t>www.py4e.com/code3/</a:t>
-            </a:r>
-            <a:r>
-              <a:rPr lang="en" sz="2300" b="0" i="0" u="none" strike="noStrike" cap="none" baseline="30000" dirty="0" err="1" smtClean="0">
-                <a:solidFill>
-                  <a:srgbClr val="FFFF00"/>
-                </a:solidFill>
-                <a:latin typeface="Helvetica Neue"/>
-                <a:ea typeface="Helvetica Neue"/>
-                <a:cs typeface="Helvetica Neue"/>
-                <a:sym typeface="Helvetica Neue"/>
-              </a:rPr>
-              <a:t>geodata.zip</a:t>
-            </a:r>
-            <a:endParaRPr lang="en" sz="2300" b="0" i="0" u="none" strike="noStrike" cap="none" baseline="30000" dirty="0">
+              <a:t>http://www.py4e.com/code3/geodata.zip</a:t>
+            </a:r>
+            <a:endParaRPr lang="pl" sz="2300" b="0" i="0" u="none" strike="noStrike" cap="none" baseline="30000" dirty="0">
               <a:solidFill>
                 <a:srgbClr val="FFFF00"/>
               </a:solidFill>
@@ -11614,13 +10919,6 @@
   <p:clrMapOvr>
     <a:masterClrMapping/>
   </p:clrMapOvr>
-  <p:timing>
-    <p:tnLst>
-      <p:par>
-        <p:cTn xmlns:p14="http://schemas.microsoft.com/office/powerpoint/2010/main" id="1" dur="indefinite" restart="never" nodeType="tmRoot"/>
-      </p:par>
-    </p:tnLst>
-  </p:timing>
 </p:sld>
 </file>
 
@@ -11691,7 +10989,7 @@
               <a:buNone/>
             </a:pPr>
             <a:r>
-              <a:rPr lang="en" sz="1500" u="none" strike="noStrike" cap="none">
+              <a:rPr lang="pl" sz="1500" b="0" i="0" u="none" strike="noStrike" cap="none" baseline="0">
                 <a:solidFill>
                   <a:srgbClr val="660066"/>
                 </a:solidFill>
@@ -11811,7 +11109,7 @@
               <a:buNone/>
             </a:pPr>
             <a:r>
-              <a:rPr lang="en" sz="1800" b="0" i="0" u="none" strike="noStrike" cap="none">
+              <a:rPr lang="pl" sz="1800" b="0" i="0" u="none" strike="noStrike" cap="none" baseline="0">
                 <a:solidFill>
                   <a:srgbClr val="FFFFFF"/>
                 </a:solidFill>
@@ -11924,7 +11222,7 @@
               <a:buNone/>
             </a:pPr>
             <a:r>
-              <a:rPr lang="en" sz="1800" b="0" i="0" u="none" strike="noStrike" cap="none">
+              <a:rPr lang="pl" sz="1800" b="0" i="0" u="none" strike="noStrike" cap="none" baseline="0">
                 <a:solidFill>
                   <a:srgbClr val="FFFFFF"/>
                 </a:solidFill>
@@ -11971,7 +11269,7 @@
               <a:buNone/>
             </a:pPr>
             <a:r>
-              <a:rPr lang="en" sz="1000" b="0" i="0" u="none" strike="noStrike" cap="none">
+              <a:rPr lang="pl" sz="1000" b="0" i="0" u="none" strike="noStrike" cap="none" baseline="0">
                 <a:solidFill>
                   <a:srgbClr val="FFFFFF"/>
                 </a:solidFill>
@@ -11992,7 +11290,7 @@
               <a:buNone/>
             </a:pPr>
             <a:r>
-              <a:rPr lang="en" sz="1000" b="0" i="0" u="none" strike="noStrike" cap="none">
+              <a:rPr lang="pl" sz="1000" b="0" i="0" u="none" strike="noStrike" cap="none" baseline="0">
                 <a:solidFill>
                   <a:srgbClr val="FFFFFF"/>
                 </a:solidFill>
@@ -12013,7 +11311,7 @@
               <a:buNone/>
             </a:pPr>
             <a:r>
-              <a:rPr lang="en" sz="1000" b="0" i="0" u="none" strike="noStrike" cap="none">
+              <a:rPr lang="pl" sz="1000" b="0" i="0" u="none" strike="noStrike" cap="none" baseline="0">
                 <a:solidFill>
                   <a:srgbClr val="FFFFFF"/>
                 </a:solidFill>
@@ -12034,7 +11332,7 @@
               <a:buNone/>
             </a:pPr>
             <a:r>
-              <a:rPr lang="en" sz="1000" b="0" i="0" u="none" strike="noStrike" cap="none">
+              <a:rPr lang="pl" sz="1000" b="0" i="0" u="none" strike="noStrike" cap="none" baseline="0">
                 <a:solidFill>
                   <a:srgbClr val="FFFFFF"/>
                 </a:solidFill>
@@ -12055,7 +11353,7 @@
               <a:buNone/>
             </a:pPr>
             <a:r>
-              <a:rPr lang="en" sz="1000" b="0" i="0" u="none" strike="noStrike" cap="none">
+              <a:rPr lang="pl" sz="1000" b="0" i="0" u="none" strike="noStrike" cap="none" baseline="0">
                 <a:solidFill>
                   <a:srgbClr val="FFFFFF"/>
                 </a:solidFill>
@@ -12076,7 +11374,7 @@
               <a:buNone/>
             </a:pPr>
             <a:r>
-              <a:rPr lang="en" sz="1000" b="0" i="0" u="none" strike="noStrike" cap="none">
+              <a:rPr lang="pl" sz="1000" b="0" i="0" u="none" strike="noStrike" cap="none" baseline="0">
                 <a:solidFill>
                   <a:srgbClr val="FFFFFF"/>
                 </a:solidFill>
@@ -12097,7 +11395,7 @@
               <a:buNone/>
             </a:pPr>
             <a:r>
-              <a:rPr lang="en" sz="1000" b="0" i="0" u="none" strike="noStrike" cap="none">
+              <a:rPr lang="pl" sz="1000" b="0" i="0" u="none" strike="noStrike" cap="none" baseline="0">
                 <a:solidFill>
                   <a:srgbClr val="FFFFFF"/>
                 </a:solidFill>
@@ -12118,7 +11416,7 @@
               <a:buNone/>
             </a:pPr>
             <a:r>
-              <a:rPr lang="en" sz="1000" b="0" i="0" u="none" strike="noStrike" cap="none">
+              <a:rPr lang="pl" sz="1000" b="0" i="0" u="none" strike="noStrike" cap="none" baseline="0">
                 <a:solidFill>
                   <a:srgbClr val="FFFFFF"/>
                 </a:solidFill>
@@ -12139,7 +11437,7 @@
               <a:buNone/>
             </a:pPr>
             <a:r>
-              <a:rPr lang="en" sz="1000" b="0" i="0" u="none" strike="noStrike" cap="none">
+              <a:rPr lang="pl" sz="1000" b="0" i="0" u="none" strike="noStrike" cap="none" baseline="0">
                 <a:solidFill>
                   <a:srgbClr val="FFFFFF"/>
                 </a:solidFill>
@@ -12237,7 +11535,7 @@
                 <a:buNone/>
               </a:pPr>
               <a:r>
-                <a:rPr lang="en" sz="1800" b="0" i="0" u="none" strike="noStrike" cap="none">
+                <a:rPr lang="pl" sz="1800" b="0" i="0" u="none" strike="noStrike" cap="none" baseline="0">
                   <a:solidFill>
                     <a:srgbClr val="660066"/>
                   </a:solidFill>
@@ -12268,7 +11566,7 @@
                 <a:buNone/>
               </a:pPr>
               <a:r>
-                <a:rPr lang="en" sz="1800" b="0" i="0" u="none" strike="noStrike" cap="none">
+                <a:rPr lang="pl" sz="1800" b="0" i="0" u="none" strike="noStrike" cap="none" baseline="0">
                   <a:solidFill>
                     <a:srgbClr val="660066"/>
                   </a:solidFill>
@@ -12330,7 +11628,7 @@
               <a:buNone/>
             </a:pPr>
             <a:r>
-              <a:rPr lang="en" sz="1500" u="none" strike="noStrike" cap="none">
+              <a:rPr lang="pl" sz="1500" b="0" i="0" u="none" strike="noStrike" cap="none" baseline="0">
                 <a:solidFill>
                   <a:srgbClr val="660066"/>
                 </a:solidFill>
@@ -12420,7 +11718,7 @@
               <a:buNone/>
             </a:pPr>
             <a:r>
-              <a:rPr lang="en" sz="1500" u="none" strike="noStrike" cap="none">
+              <a:rPr lang="pl" sz="1500" b="0" i="0" u="none" strike="noStrike" cap="none" baseline="0">
                 <a:solidFill>
                   <a:srgbClr val="660066"/>
                 </a:solidFill>
@@ -12481,7 +11779,7 @@
               <a:buNone/>
             </a:pPr>
             <a:r>
-              <a:rPr lang="en" sz="1500" u="none" strike="noStrike" cap="none">
+              <a:rPr lang="pl" sz="1500" b="0" i="0" u="none" strike="noStrike" cap="none" baseline="0">
                 <a:solidFill>
                   <a:srgbClr val="660066"/>
                 </a:solidFill>
@@ -12615,7 +11913,7 @@
               <a:buNone/>
             </a:pPr>
             <a:r>
-              <a:rPr lang="en" sz="2300" b="0" i="0" u="none" strike="noStrike" cap="none" baseline="30000" dirty="0">
+              <a:rPr lang="pl" sz="2300" b="0" i="0" u="none" strike="noStrike" cap="none" baseline="30000">
                 <a:solidFill>
                   <a:srgbClr val="FFFF00"/>
                 </a:solidFill>
@@ -12624,33 +11922,9 @@
                 <a:cs typeface="Helvetica Neue"/>
                 <a:sym typeface="Helvetica Neue"/>
               </a:rPr>
-              <a:t>http://</a:t>
-            </a:r>
-            <a:r>
-              <a:rPr lang="en" sz="2300" b="0" i="0" u="none" strike="noStrike" cap="none" baseline="30000" dirty="0" smtClean="0">
-                <a:solidFill>
-                  <a:srgbClr val="FFFF00"/>
-                </a:solidFill>
-                <a:latin typeface="Helvetica Neue"/>
-                <a:ea typeface="Helvetica Neue"/>
-                <a:cs typeface="Helvetica Neue"/>
-                <a:sym typeface="Helvetica Neue"/>
-              </a:rPr>
-              <a:t>www.py4e.com/code3/</a:t>
-            </a:r>
-            <a:r>
-              <a:rPr lang="en" sz="2300" b="0" i="0" u="none" strike="noStrike" cap="none" baseline="30000" dirty="0" err="1" smtClean="0">
-                <a:solidFill>
-                  <a:srgbClr val="FFFF00"/>
-                </a:solidFill>
-                <a:latin typeface="Helvetica Neue"/>
-                <a:ea typeface="Helvetica Neue"/>
-                <a:cs typeface="Helvetica Neue"/>
-                <a:sym typeface="Helvetica Neue"/>
-              </a:rPr>
-              <a:t>geodata.zip</a:t>
-            </a:r>
-            <a:endParaRPr lang="en" sz="2300" b="0" i="0" u="none" strike="noStrike" cap="none" baseline="30000" dirty="0">
+              <a:t>http://www.py4e.com/code3/geodata.zip</a:t>
+            </a:r>
+            <a:endParaRPr lang="pl" sz="2300" b="0" i="0" u="none" strike="noStrike" cap="none" baseline="30000" dirty="0">
               <a:solidFill>
                 <a:srgbClr val="FFFF00"/>
               </a:solidFill>
@@ -12667,13 +11941,6 @@
   <p:clrMapOvr>
     <a:masterClrMapping/>
   </p:clrMapOvr>
-  <p:timing>
-    <p:tnLst>
-      <p:par>
-        <p:cTn xmlns:p14="http://schemas.microsoft.com/office/powerpoint/2010/main" id="1" dur="indefinite" restart="never" nodeType="tmRoot"/>
-      </p:par>
-    </p:tnLst>
-  </p:timing>
 </p:sld>
 </file>
 
@@ -12731,7 +11998,7 @@
               <a:buNone/>
             </a:pPr>
             <a:r>
-              <a:rPr lang="en" sz="4300" u="none" strike="noStrike" cap="none">
+              <a:rPr lang="pl" sz="4300" b="0" i="0" u="none" strike="noStrike" cap="none" baseline="0">
                 <a:solidFill>
                   <a:srgbClr val="FFD966"/>
                 </a:solidFill>
@@ -12785,13 +12052,13 @@
               <a:buFont typeface="Cabin"/>
             </a:pPr>
             <a:r>
-              <a:rPr lang="en" sz="2000" u="none" strike="noStrike" cap="none">
+              <a:rPr lang="pl" sz="2000" b="0" i="0" u="none" strike="noStrike" cap="none" baseline="0">
                 <a:solidFill>
                   <a:srgbClr val="FFFFFF"/>
                 </a:solidFill>
                 <a:sym typeface="Cabin"/>
               </a:rPr>
-              <a:t>Write a simple web page crawler</a:t>
+              <a:t>Napisz prostego robota internetowego</a:t>
             </a:r>
           </a:p>
           <a:p>
@@ -12809,13 +12076,13 @@
               <a:buFont typeface="Cabin"/>
             </a:pPr>
             <a:r>
-              <a:rPr lang="en" sz="2000" u="none" strike="noStrike" cap="none" dirty="0">
+              <a:rPr lang="pl" sz="2000" b="0" i="0" u="none" strike="noStrike" cap="none" baseline="0">
                 <a:solidFill>
                   <a:srgbClr val="FFFFFF"/>
                 </a:solidFill>
                 <a:sym typeface="Cabin"/>
               </a:rPr>
-              <a:t>Compute a simple version of Google's Page Rank algorithm</a:t>
+              <a:t>Uruchom prostą wersję algorytmu Google PageRank</a:t>
             </a:r>
           </a:p>
           <a:p>
@@ -12833,13 +12100,13 @@
               <a:buFont typeface="Cabin"/>
             </a:pPr>
             <a:r>
-              <a:rPr lang="en" sz="2000" u="none" strike="noStrike" cap="none" dirty="0">
+              <a:rPr lang="pl" sz="2000" b="0" i="0" u="none" strike="noStrike" cap="none" baseline="0">
                 <a:solidFill>
                   <a:srgbClr val="FFFFFF"/>
                 </a:solidFill>
                 <a:sym typeface="Cabin"/>
               </a:rPr>
-              <a:t>Visualize the resulting network</a:t>
+              <a:t>Zwizualizuj otrzymaną sieć</a:t>
             </a:r>
           </a:p>
         </p:txBody>
@@ -12877,7 +12144,7 @@
               <a:buNone/>
             </a:pPr>
             <a:r>
-              <a:rPr lang="en" sz="2300" b="0" i="0" u="none" strike="noStrike" cap="none" baseline="30000" dirty="0">
+              <a:rPr lang="pl" sz="2300" b="0" i="0" u="none" strike="noStrike" cap="none" baseline="30000">
                 <a:solidFill>
                   <a:srgbClr val="FFFF00"/>
                 </a:solidFill>
@@ -12886,33 +12153,9 @@
                 <a:cs typeface="Helvetica Neue"/>
                 <a:sym typeface="Helvetica Neue"/>
               </a:rPr>
-              <a:t>http://</a:t>
-            </a:r>
-            <a:r>
-              <a:rPr lang="en" sz="2300" b="0" i="0" u="none" strike="noStrike" cap="none" baseline="30000" dirty="0" smtClean="0">
-                <a:solidFill>
-                  <a:srgbClr val="FFFF00"/>
-                </a:solidFill>
-                <a:latin typeface="Helvetica Neue"/>
-                <a:ea typeface="Helvetica Neue"/>
-                <a:cs typeface="Helvetica Neue"/>
-                <a:sym typeface="Helvetica Neue"/>
-              </a:rPr>
-              <a:t>www.py4e.com/code3/</a:t>
-            </a:r>
-            <a:r>
-              <a:rPr lang="en" sz="2300" b="0" i="0" u="none" strike="noStrike" cap="none" baseline="30000" dirty="0" err="1" smtClean="0">
-                <a:solidFill>
-                  <a:srgbClr val="FFFF00"/>
-                </a:solidFill>
-                <a:latin typeface="Helvetica Neue"/>
-                <a:ea typeface="Helvetica Neue"/>
-                <a:cs typeface="Helvetica Neue"/>
-                <a:sym typeface="Helvetica Neue"/>
-              </a:rPr>
-              <a:t>pagerank.zip</a:t>
-            </a:r>
-            <a:endParaRPr lang="en" sz="2300" b="0" i="0" u="none" strike="noStrike" cap="none" baseline="30000" dirty="0">
+              <a:t>http://www.py4e.com/code3/pagerank.zip</a:t>
+            </a:r>
+            <a:endParaRPr lang="pl" sz="2300" b="0" i="0" u="none" strike="noStrike" cap="none" baseline="30000" dirty="0">
               <a:solidFill>
                 <a:srgbClr val="FFFF00"/>
               </a:solidFill>
@@ -12956,13 +12199,6 @@
   <p:clrMapOvr>
     <a:masterClrMapping/>
   </p:clrMapOvr>
-  <p:timing>
-    <p:tnLst>
-      <p:par>
-        <p:cTn xmlns:p14="http://schemas.microsoft.com/office/powerpoint/2010/main" id="1" dur="indefinite" restart="never" nodeType="tmRoot"/>
-      </p:par>
-    </p:tnLst>
-  </p:timing>
 </p:sld>
 </file>
 
@@ -13016,13 +12252,13 @@
               <a:buNone/>
             </a:pPr>
             <a:r>
-              <a:rPr lang="en" sz="4300" u="none" strike="noStrike" cap="none">
+              <a:rPr lang="pl" sz="4300" b="0" i="0" u="none" strike="noStrike" cap="none" baseline="0">
                 <a:solidFill>
                   <a:srgbClr val="FFD966"/>
                 </a:solidFill>
                 <a:sym typeface="Cabin"/>
               </a:rPr>
-              <a:t>Search Engine Architecture</a:t>
+              <a:t>Architektura wyszukiwarki</a:t>
             </a:r>
           </a:p>
         </p:txBody>
@@ -13067,13 +12303,13 @@
               <a:buFont typeface="Cabin"/>
             </a:pPr>
             <a:r>
-              <a:rPr lang="en" sz="2900" u="none" strike="noStrike" cap="none">
+              <a:rPr lang="pl" sz="2900" b="0" i="0" u="none" strike="noStrike" cap="none" baseline="0">
                 <a:solidFill>
                   <a:srgbClr val="FFFB00"/>
                 </a:solidFill>
                 <a:sym typeface="Cabin"/>
               </a:rPr>
-              <a:t>Web Crawling</a:t>
+              <a:t>Roboty internetowe</a:t>
             </a:r>
           </a:p>
           <a:p>
@@ -13088,13 +12324,13 @@
               <a:buFont typeface="Cabin"/>
             </a:pPr>
             <a:r>
-              <a:rPr lang="en" sz="2900" u="none" strike="noStrike" cap="none">
+              <a:rPr lang="pl" sz="2900" b="0" i="0" u="none" strike="noStrike" cap="none" baseline="0">
                 <a:solidFill>
                   <a:srgbClr val="FFFFFF"/>
                 </a:solidFill>
                 <a:sym typeface="Cabin"/>
               </a:rPr>
-              <a:t>Index Building</a:t>
+              <a:t>Tworzenie indeksu</a:t>
             </a:r>
           </a:p>
           <a:p>
@@ -13109,13 +12345,13 @@
               <a:buFont typeface="Cabin"/>
             </a:pPr>
             <a:r>
-              <a:rPr lang="en" sz="2900" u="none" strike="noStrike" cap="none">
+              <a:rPr lang="pl" sz="2900" b="0" i="0" u="none" strike="noStrike" cap="none" baseline="0">
                 <a:solidFill>
                   <a:srgbClr val="FFFFFF"/>
                 </a:solidFill>
                 <a:sym typeface="Cabin"/>
               </a:rPr>
-              <a:t>Searching</a:t>
+              <a:t>Wyszukiwanie</a:t>
             </a:r>
           </a:p>
         </p:txBody>
@@ -13180,7 +12416,7 @@
               <a:buNone/>
             </a:pPr>
             <a:r>
-              <a:rPr lang="en" sz="1800" u="none" strike="noStrike" cap="none" dirty="0">
+              <a:rPr lang="pl" sz="1800" b="0" i="0" u="none" strike="noStrike" cap="none" baseline="0">
                 <a:solidFill>
                   <a:srgbClr val="FFFB00"/>
                 </a:solidFill>
@@ -13189,45 +12425,9 @@
                 <a:cs typeface="Arial Regular" charset="0"/>
                 <a:sym typeface="Cabin"/>
               </a:rPr>
-              <a:t>http://</a:t>
-            </a:r>
-            <a:r>
-              <a:rPr lang="en" sz="1800" u="none" strike="noStrike" cap="none" dirty="0" err="1">
-                <a:solidFill>
-                  <a:srgbClr val="FFFB00"/>
-                </a:solidFill>
-                <a:latin typeface="Arial Regular" charset="0"/>
-                <a:ea typeface="Arial Regular" charset="0"/>
-                <a:cs typeface="Arial Regular" charset="0"/>
-                <a:sym typeface="Cabin"/>
-              </a:rPr>
-              <a:t>infolab.stanford.edu</a:t>
-            </a:r>
-            <a:r>
-              <a:rPr lang="en" sz="1800" u="none" strike="noStrike" cap="none" dirty="0">
-                <a:solidFill>
-                  <a:srgbClr val="FFFB00"/>
-                </a:solidFill>
-                <a:latin typeface="Arial Regular" charset="0"/>
-                <a:ea typeface="Arial Regular" charset="0"/>
-                <a:cs typeface="Arial Regular" charset="0"/>
-                <a:sym typeface="Cabin"/>
-              </a:rPr>
-              <a:t>/~backrub/</a:t>
-            </a:r>
-            <a:r>
-              <a:rPr lang="en" sz="1800" u="none" strike="noStrike" cap="none" dirty="0" err="1">
-                <a:solidFill>
-                  <a:srgbClr val="FFFB00"/>
-                </a:solidFill>
-                <a:latin typeface="Arial Regular" charset="0"/>
-                <a:ea typeface="Arial Regular" charset="0"/>
-                <a:cs typeface="Arial Regular" charset="0"/>
-                <a:sym typeface="Cabin"/>
-              </a:rPr>
-              <a:t>google.html</a:t>
-            </a:r>
-            <a:endParaRPr lang="en" sz="1800" u="none" strike="noStrike" cap="none" dirty="0">
+              <a:t>http://infolab.stanford.edu/~backrub/google.html</a:t>
+            </a:r>
+            <a:endParaRPr lang="pl" sz="1800" u="none" strike="noStrike" cap="none" dirty="0">
               <a:solidFill>
                 <a:srgbClr val="FFFB00"/>
               </a:solidFill>
@@ -13244,13 +12444,6 @@
   <p:clrMapOvr>
     <a:masterClrMapping/>
   </p:clrMapOvr>
-  <p:timing>
-    <p:tnLst>
-      <p:par>
-        <p:cTn xmlns:p14="http://schemas.microsoft.com/office/powerpoint/2010/main" id="1" dur="indefinite" restart="never" nodeType="tmRoot"/>
-      </p:par>
-    </p:tnLst>
-  </p:timing>
 </p:sld>
 </file>
 
@@ -13307,7 +12500,7 @@
               <a:buNone/>
             </a:pPr>
             <a:r>
-              <a:rPr lang="en" sz="2000" u="none" strike="noStrike" cap="none" dirty="0">
+              <a:rPr lang="pl" sz="2000" b="0" i="0" u="none" strike="noStrike" cap="none" baseline="0" dirty="0">
                 <a:solidFill>
                   <a:srgbClr val="FFFFFF"/>
                 </a:solidFill>
@@ -13316,7 +12509,7 @@
                 <a:cs typeface="Arial Regular" charset="0"/>
                 <a:sym typeface="Cabin"/>
               </a:rPr>
-              <a:t>A Web crawler is a computer program that browses the World Wide Web in a methodical, automated manner. Web crawlers are mainly used to create a copy of all the visited pages for later processing by a search engine that will index the downloaded pages to provide fast searches.</a:t>
+              <a:t>Robot internetowy to program, który przeszukuje strony sieci web w metodyczny, zautomatyzowany sposób. Roboty służą głównie do tworzenia kopii odwiedzonych stron w celu późniejszego przetworzenia i zindeksowania, co pozwala na szybkie wyszukiwanie.</a:t>
             </a:r>
           </a:p>
         </p:txBody>
@@ -13354,13 +12547,13 @@
               <a:buNone/>
             </a:pPr>
             <a:r>
-              <a:rPr lang="en" sz="4300" u="none" strike="noStrike" cap="none">
+              <a:rPr lang="pl" sz="4300" b="0" i="0" u="none" strike="noStrike" cap="none" baseline="0" dirty="0">
                 <a:solidFill>
                   <a:srgbClr val="FFD966"/>
                 </a:solidFill>
                 <a:sym typeface="Cabin"/>
               </a:rPr>
-              <a:t>Web Crawler</a:t>
+              <a:t>Robot internetowy</a:t>
             </a:r>
           </a:p>
         </p:txBody>
@@ -13398,7 +12591,7 @@
               <a:buNone/>
             </a:pPr>
             <a:r>
-              <a:rPr lang="en" sz="2000" u="none" strike="noStrike" cap="none">
+              <a:rPr lang="en" sz="2000" u="none" strike="noStrike" cap="none" dirty="0">
                 <a:solidFill>
                   <a:srgbClr val="FFFF00"/>
                 </a:solidFill>
@@ -13417,13 +12610,6 @@
   <p:clrMapOvr>
     <a:masterClrMapping/>
   </p:clrMapOvr>
-  <p:timing>
-    <p:tnLst>
-      <p:par>
-        <p:cTn xmlns:p14="http://schemas.microsoft.com/office/powerpoint/2010/main" id="1" dur="indefinite" restart="never" nodeType="tmRoot"/>
-      </p:par>
-    </p:tnLst>
-  </p:timing>
 </p:sld>
 </file>
 

</xml_diff>